<commit_message>
Busy with the presentation.
</commit_message>
<xml_diff>
--- a/LearningHubInReview.pptx
+++ b/LearningHubInReview.pptx
@@ -6,6 +6,9 @@
   </p:sldMasterIdLst>
   <p:sldIdLst>
     <p:sldId id="256" r:id="rId2"/>
+    <p:sldId id="257" r:id="rId3"/>
+    <p:sldId id="259" r:id="rId4"/>
+    <p:sldId id="258" r:id="rId5"/>
   </p:sldIdLst>
   <p:sldSz cx="12192000" cy="6858000"/>
   <p:notesSz cx="6858000" cy="9144000"/>
@@ -104,6 +107,11 @@
       </a:defRPr>
     </a:lvl9pPr>
   </p:defaultTextStyle>
+  <p:extLst>
+    <p:ext uri="{EFAFB233-063F-42B5-8137-9DF3F51BA10A}">
+      <p15:sldGuideLst xmlns:p15="http://schemas.microsoft.com/office/powerpoint/2012/main"/>
+    </p:ext>
+  </p:extLst>
 </p:presentation>
 </file>
 
@@ -153,7 +161,7 @@
           </a:lstStyle>
           <a:p>
             <a:r>
-              <a:rPr lang="en-US" smtClean="0"/>
+              <a:rPr lang="en-US"/>
               <a:t>Click to edit Master title style</a:t>
             </a:r>
             <a:endParaRPr lang="en-US" dirty="0"/>
@@ -274,7 +282,7 @@
           </a:lstStyle>
           <a:p>
             <a:r>
-              <a:rPr lang="en-US" smtClean="0"/>
+              <a:rPr lang="en-US"/>
               <a:t>Click to edit Master subtitle style</a:t>
             </a:r>
             <a:endParaRPr lang="en-US" dirty="0"/>
@@ -299,7 +307,7 @@
             <a:fld id="{B61BEF0D-F0BB-DE4B-95CE-6DB70DBA9567}" type="datetimeFigureOut">
               <a:rPr lang="en-US" dirty="0"/>
               <a:pPr/>
-              <a:t>3/8/2019</a:t>
+              <a:t>2019-03-11</a:t>
             </a:fld>
             <a:endParaRPr lang="en-US" dirty="0"/>
           </a:p>
@@ -564,7 +572,7 @@
           <a:lstStyle/>
           <a:p>
             <a:r>
-              <a:rPr lang="en-US" smtClean="0"/>
+              <a:rPr lang="en-US"/>
               <a:t>Click to edit Master title style</a:t>
             </a:r>
             <a:endParaRPr lang="en-US" dirty="0"/>
@@ -651,7 +659,7 @@
           </a:lstStyle>
           <a:p>
             <a:r>
-              <a:rPr lang="en-US" smtClean="0"/>
+              <a:rPr lang="en-US"/>
               <a:t>Click icon to add picture</a:t>
             </a:r>
             <a:endParaRPr lang="en-US" dirty="0"/>
@@ -708,7 +716,7 @@
           <a:p>
             <a:pPr lvl="0"/>
             <a:r>
-              <a:rPr lang="en-US" smtClean="0"/>
+              <a:rPr lang="en-US"/>
               <a:t>Edit Master text styles</a:t>
             </a:r>
           </a:p>
@@ -732,7 +740,7 @@
             <a:fld id="{B61BEF0D-F0BB-DE4B-95CE-6DB70DBA9567}" type="datetimeFigureOut">
               <a:rPr lang="en-US" dirty="0"/>
               <a:pPr/>
-              <a:t>3/8/2019</a:t>
+              <a:t>2019-03-11</a:t>
             </a:fld>
             <a:endParaRPr lang="en-US" dirty="0"/>
           </a:p>
@@ -833,7 +841,7 @@
           </a:lstStyle>
           <a:p>
             <a:r>
-              <a:rPr lang="en-US" smtClean="0"/>
+              <a:rPr lang="en-US"/>
               <a:t>Click to edit Master title style</a:t>
             </a:r>
             <a:endParaRPr lang="en-US" dirty="0"/>
@@ -955,7 +963,7 @@
           <a:p>
             <a:pPr lvl="0"/>
             <a:r>
-              <a:rPr lang="en-US" smtClean="0"/>
+              <a:rPr lang="en-US"/>
               <a:t>Edit Master text styles</a:t>
             </a:r>
           </a:p>
@@ -979,7 +987,7 @@
             <a:fld id="{B61BEF0D-F0BB-DE4B-95CE-6DB70DBA9567}" type="datetimeFigureOut">
               <a:rPr lang="en-US" dirty="0"/>
               <a:pPr/>
-              <a:t>3/8/2019</a:t>
+              <a:t>2019-03-11</a:t>
             </a:fld>
             <a:endParaRPr lang="en-US" dirty="0"/>
           </a:p>
@@ -1084,7 +1092,7 @@
           </a:lstStyle>
           <a:p>
             <a:r>
-              <a:rPr lang="en-US" smtClean="0"/>
+              <a:rPr lang="en-US"/>
               <a:t>Click to edit Master title style</a:t>
             </a:r>
             <a:endParaRPr lang="en-US" dirty="0"/>
@@ -1139,7 +1147,7 @@
           <a:p>
             <a:pPr lvl="0"/>
             <a:r>
-              <a:rPr lang="en-US" smtClean="0"/>
+              <a:rPr lang="en-US"/>
               <a:t>Edit Master text styles</a:t>
             </a:r>
           </a:p>
@@ -1260,7 +1268,7 @@
           <a:p>
             <a:pPr lvl="0"/>
             <a:r>
-              <a:rPr lang="en-US" smtClean="0"/>
+              <a:rPr lang="en-US"/>
               <a:t>Edit Master text styles</a:t>
             </a:r>
           </a:p>
@@ -1284,7 +1292,7 @@
             <a:fld id="{B61BEF0D-F0BB-DE4B-95CE-6DB70DBA9567}" type="datetimeFigureOut">
               <a:rPr lang="en-US" dirty="0"/>
               <a:pPr/>
-              <a:t>3/8/2019</a:t>
+              <a:t>2019-03-11</a:t>
             </a:fld>
             <a:endParaRPr lang="en-US" dirty="0"/>
           </a:p>
@@ -1453,7 +1461,7 @@
           </a:lstStyle>
           <a:p>
             <a:r>
-              <a:rPr lang="en-US" smtClean="0"/>
+              <a:rPr lang="en-US"/>
               <a:t>Click to edit Master title style</a:t>
             </a:r>
             <a:endParaRPr lang="en-US" dirty="0"/>
@@ -1575,7 +1583,7 @@
           <a:p>
             <a:pPr lvl="0"/>
             <a:r>
-              <a:rPr lang="en-US" smtClean="0"/>
+              <a:rPr lang="en-US"/>
               <a:t>Edit Master text styles</a:t>
             </a:r>
           </a:p>
@@ -1599,7 +1607,7 @@
             <a:fld id="{B61BEF0D-F0BB-DE4B-95CE-6DB70DBA9567}" type="datetimeFigureOut">
               <a:rPr lang="en-US" dirty="0"/>
               <a:pPr/>
-              <a:t>3/8/2019</a:t>
+              <a:t>2019-03-11</a:t>
             </a:fld>
             <a:endParaRPr lang="en-US" dirty="0"/>
           </a:p>
@@ -1704,7 +1712,7 @@
           </a:lstStyle>
           <a:p>
             <a:r>
-              <a:rPr lang="en-US" smtClean="0"/>
+              <a:rPr lang="en-US"/>
               <a:t>Click to edit Master title style</a:t>
             </a:r>
             <a:endParaRPr lang="en-US" dirty="0"/>
@@ -1753,7 +1761,7 @@
               <a:buNone/>
             </a:pPr>
             <a:r>
-              <a:rPr lang="en-US" smtClean="0"/>
+              <a:rPr lang="en-US"/>
               <a:t>Edit Master text styles</a:t>
             </a:r>
           </a:p>
@@ -1874,7 +1882,7 @@
           <a:p>
             <a:pPr lvl="0"/>
             <a:r>
-              <a:rPr lang="en-US" smtClean="0"/>
+              <a:rPr lang="en-US"/>
               <a:t>Edit Master text styles</a:t>
             </a:r>
           </a:p>
@@ -1898,7 +1906,7 @@
             <a:fld id="{B61BEF0D-F0BB-DE4B-95CE-6DB70DBA9567}" type="datetimeFigureOut">
               <a:rPr lang="en-US" dirty="0"/>
               <a:pPr/>
-              <a:t>3/8/2019</a:t>
+              <a:t>2019-03-11</a:t>
             </a:fld>
             <a:endParaRPr lang="en-US" dirty="0"/>
           </a:p>
@@ -2068,7 +2076,7 @@
           <a:p>
             <a:pPr marL="0" lvl="0"/>
             <a:r>
-              <a:rPr lang="en-US" smtClean="0"/>
+              <a:rPr lang="en-US"/>
               <a:t>Click to edit Master title style</a:t>
             </a:r>
             <a:endParaRPr lang="en-US" dirty="0"/>
@@ -2117,7 +2125,7 @@
               <a:buNone/>
             </a:pPr>
             <a:r>
-              <a:rPr lang="en-US" smtClean="0"/>
+              <a:rPr lang="en-US"/>
               <a:t>Edit Master text styles</a:t>
             </a:r>
           </a:p>
@@ -2238,7 +2246,7 @@
           <a:p>
             <a:pPr lvl="0"/>
             <a:r>
-              <a:rPr lang="en-US" smtClean="0"/>
+              <a:rPr lang="en-US"/>
               <a:t>Edit Master text styles</a:t>
             </a:r>
           </a:p>
@@ -2262,7 +2270,7 @@
             <a:fld id="{B61BEF0D-F0BB-DE4B-95CE-6DB70DBA9567}" type="datetimeFigureOut">
               <a:rPr lang="en-US" dirty="0"/>
               <a:pPr/>
-              <a:t>3/8/2019</a:t>
+              <a:t>2019-03-11</a:t>
             </a:fld>
             <a:endParaRPr lang="en-US" dirty="0"/>
           </a:p>
@@ -2356,7 +2364,7 @@
           </a:lstStyle>
           <a:p>
             <a:r>
-              <a:rPr lang="en-US" smtClean="0"/>
+              <a:rPr lang="en-US"/>
               <a:t>Click to edit Master title style</a:t>
             </a:r>
             <a:endParaRPr lang="en-US" dirty="0"/>
@@ -2380,35 +2388,35 @@
           <a:p>
             <a:pPr lvl="0"/>
             <a:r>
-              <a:rPr lang="en-US" smtClean="0"/>
+              <a:rPr lang="en-US"/>
               <a:t>Edit Master text styles</a:t>
             </a:r>
           </a:p>
           <a:p>
             <a:pPr lvl="1"/>
             <a:r>
-              <a:rPr lang="en-US" smtClean="0"/>
+              <a:rPr lang="en-US"/>
               <a:t>Second level</a:t>
             </a:r>
           </a:p>
           <a:p>
             <a:pPr lvl="2"/>
             <a:r>
-              <a:rPr lang="en-US" smtClean="0"/>
+              <a:rPr lang="en-US"/>
               <a:t>Third level</a:t>
             </a:r>
           </a:p>
           <a:p>
             <a:pPr lvl="3"/>
             <a:r>
-              <a:rPr lang="en-US" smtClean="0"/>
+              <a:rPr lang="en-US"/>
               <a:t>Fourth level</a:t>
             </a:r>
           </a:p>
           <a:p>
             <a:pPr lvl="4"/>
             <a:r>
-              <a:rPr lang="en-US" smtClean="0"/>
+              <a:rPr lang="en-US"/>
               <a:t>Fifth level</a:t>
             </a:r>
             <a:endParaRPr lang="en-US" dirty="0"/>
@@ -2433,7 +2441,7 @@
             <a:fld id="{B61BEF0D-F0BB-DE4B-95CE-6DB70DBA9567}" type="datetimeFigureOut">
               <a:rPr lang="en-US" dirty="0"/>
               <a:pPr/>
-              <a:t>3/8/2019</a:t>
+              <a:t>2019-03-11</a:t>
             </a:fld>
             <a:endParaRPr lang="en-US" dirty="0"/>
           </a:p>
@@ -2528,7 +2536,7 @@
           <a:lstStyle/>
           <a:p>
             <a:r>
-              <a:rPr lang="en-US" smtClean="0"/>
+              <a:rPr lang="en-US"/>
               <a:t>Click to edit Master title style</a:t>
             </a:r>
             <a:endParaRPr lang="en-US" dirty="0"/>
@@ -2557,35 +2565,35 @@
           <a:p>
             <a:pPr lvl="0"/>
             <a:r>
-              <a:rPr lang="en-US" smtClean="0"/>
+              <a:rPr lang="en-US"/>
               <a:t>Edit Master text styles</a:t>
             </a:r>
           </a:p>
           <a:p>
             <a:pPr lvl="1"/>
             <a:r>
-              <a:rPr lang="en-US" smtClean="0"/>
+              <a:rPr lang="en-US"/>
               <a:t>Second level</a:t>
             </a:r>
           </a:p>
           <a:p>
             <a:pPr lvl="2"/>
             <a:r>
-              <a:rPr lang="en-US" smtClean="0"/>
+              <a:rPr lang="en-US"/>
               <a:t>Third level</a:t>
             </a:r>
           </a:p>
           <a:p>
             <a:pPr lvl="3"/>
             <a:r>
-              <a:rPr lang="en-US" smtClean="0"/>
+              <a:rPr lang="en-US"/>
               <a:t>Fourth level</a:t>
             </a:r>
           </a:p>
           <a:p>
             <a:pPr lvl="4"/>
             <a:r>
-              <a:rPr lang="en-US" smtClean="0"/>
+              <a:rPr lang="en-US"/>
               <a:t>Fifth level</a:t>
             </a:r>
             <a:endParaRPr lang="en-US" dirty="0"/>
@@ -2610,7 +2618,7 @@
             <a:fld id="{B61BEF0D-F0BB-DE4B-95CE-6DB70DBA9567}" type="datetimeFigureOut">
               <a:rPr lang="en-US" dirty="0"/>
               <a:pPr/>
-              <a:t>3/8/2019</a:t>
+              <a:t>2019-03-11</a:t>
             </a:fld>
             <a:endParaRPr lang="en-US" dirty="0"/>
           </a:p>
@@ -2700,7 +2708,7 @@
           <a:lstStyle/>
           <a:p>
             <a:r>
-              <a:rPr lang="en-US" smtClean="0"/>
+              <a:rPr lang="en-US"/>
               <a:t>Click to edit Master title style</a:t>
             </a:r>
             <a:endParaRPr lang="en-US" dirty="0"/>
@@ -2724,35 +2732,35 @@
           <a:p>
             <a:pPr lvl="0"/>
             <a:r>
-              <a:rPr lang="en-US" smtClean="0"/>
+              <a:rPr lang="en-US"/>
               <a:t>Edit Master text styles</a:t>
             </a:r>
           </a:p>
           <a:p>
             <a:pPr lvl="1"/>
             <a:r>
-              <a:rPr lang="en-US" smtClean="0"/>
+              <a:rPr lang="en-US"/>
               <a:t>Second level</a:t>
             </a:r>
           </a:p>
           <a:p>
             <a:pPr lvl="2"/>
             <a:r>
-              <a:rPr lang="en-US" smtClean="0"/>
+              <a:rPr lang="en-US"/>
               <a:t>Third level</a:t>
             </a:r>
           </a:p>
           <a:p>
             <a:pPr lvl="3"/>
             <a:r>
-              <a:rPr lang="en-US" smtClean="0"/>
+              <a:rPr lang="en-US"/>
               <a:t>Fourth level</a:t>
             </a:r>
           </a:p>
           <a:p>
             <a:pPr lvl="4"/>
             <a:r>
-              <a:rPr lang="en-US" smtClean="0"/>
+              <a:rPr lang="en-US"/>
               <a:t>Fifth level</a:t>
             </a:r>
             <a:endParaRPr lang="en-US" dirty="0"/>
@@ -2777,7 +2785,7 @@
             <a:fld id="{B61BEF0D-F0BB-DE4B-95CE-6DB70DBA9567}" type="datetimeFigureOut">
               <a:rPr lang="en-US" dirty="0"/>
               <a:pPr/>
-              <a:t>3/8/2019</a:t>
+              <a:t>2019-03-11</a:t>
             </a:fld>
             <a:endParaRPr lang="en-US" dirty="0"/>
           </a:p>
@@ -2878,7 +2886,7 @@
           </a:lstStyle>
           <a:p>
             <a:r>
-              <a:rPr lang="en-US" smtClean="0"/>
+              <a:rPr lang="en-US"/>
               <a:t>Click to edit Master title style</a:t>
             </a:r>
             <a:endParaRPr lang="en-US" dirty="0"/>
@@ -3000,7 +3008,7 @@
           <a:p>
             <a:pPr lvl="0"/>
             <a:r>
-              <a:rPr lang="en-US" smtClean="0"/>
+              <a:rPr lang="en-US"/>
               <a:t>Edit Master text styles</a:t>
             </a:r>
           </a:p>
@@ -3024,7 +3032,7 @@
             <a:fld id="{B61BEF0D-F0BB-DE4B-95CE-6DB70DBA9567}" type="datetimeFigureOut">
               <a:rPr lang="en-US" dirty="0"/>
               <a:pPr/>
-              <a:t>3/8/2019</a:t>
+              <a:t>2019-03-11</a:t>
             </a:fld>
             <a:endParaRPr lang="en-US" dirty="0"/>
           </a:p>
@@ -3114,7 +3122,7 @@
           <a:lstStyle/>
           <a:p>
             <a:r>
-              <a:rPr lang="en-US" smtClean="0"/>
+              <a:rPr lang="en-US"/>
               <a:t>Click to edit Master title style</a:t>
             </a:r>
             <a:endParaRPr lang="en-US" dirty="0"/>
@@ -3145,35 +3153,35 @@
           <a:p>
             <a:pPr lvl="0"/>
             <a:r>
-              <a:rPr lang="en-US" smtClean="0"/>
+              <a:rPr lang="en-US"/>
               <a:t>Edit Master text styles</a:t>
             </a:r>
           </a:p>
           <a:p>
             <a:pPr lvl="1"/>
             <a:r>
-              <a:rPr lang="en-US" smtClean="0"/>
+              <a:rPr lang="en-US"/>
               <a:t>Second level</a:t>
             </a:r>
           </a:p>
           <a:p>
             <a:pPr lvl="2"/>
             <a:r>
-              <a:rPr lang="en-US" smtClean="0"/>
+              <a:rPr lang="en-US"/>
               <a:t>Third level</a:t>
             </a:r>
           </a:p>
           <a:p>
             <a:pPr lvl="3"/>
             <a:r>
-              <a:rPr lang="en-US" smtClean="0"/>
+              <a:rPr lang="en-US"/>
               <a:t>Fourth level</a:t>
             </a:r>
           </a:p>
           <a:p>
             <a:pPr lvl="4"/>
             <a:r>
-              <a:rPr lang="en-US" smtClean="0"/>
+              <a:rPr lang="en-US"/>
               <a:t>Fifth level</a:t>
             </a:r>
             <a:endParaRPr lang="en-US" dirty="0"/>
@@ -3204,35 +3212,35 @@
           <a:p>
             <a:pPr lvl="0"/>
             <a:r>
-              <a:rPr lang="en-US" smtClean="0"/>
+              <a:rPr lang="en-US"/>
               <a:t>Edit Master text styles</a:t>
             </a:r>
           </a:p>
           <a:p>
             <a:pPr lvl="1"/>
             <a:r>
-              <a:rPr lang="en-US" smtClean="0"/>
+              <a:rPr lang="en-US"/>
               <a:t>Second level</a:t>
             </a:r>
           </a:p>
           <a:p>
             <a:pPr lvl="2"/>
             <a:r>
-              <a:rPr lang="en-US" smtClean="0"/>
+              <a:rPr lang="en-US"/>
               <a:t>Third level</a:t>
             </a:r>
           </a:p>
           <a:p>
             <a:pPr lvl="3"/>
             <a:r>
-              <a:rPr lang="en-US" smtClean="0"/>
+              <a:rPr lang="en-US"/>
               <a:t>Fourth level</a:t>
             </a:r>
           </a:p>
           <a:p>
             <a:pPr lvl="4"/>
             <a:r>
-              <a:rPr lang="en-US" smtClean="0"/>
+              <a:rPr lang="en-US"/>
               <a:t>Fifth level</a:t>
             </a:r>
             <a:endParaRPr lang="en-US" dirty="0"/>
@@ -3257,7 +3265,7 @@
             <a:fld id="{B61BEF0D-F0BB-DE4B-95CE-6DB70DBA9567}" type="datetimeFigureOut">
               <a:rPr lang="en-US" dirty="0"/>
               <a:pPr/>
-              <a:t>3/8/2019</a:t>
+              <a:t>2019-03-11</a:t>
             </a:fld>
             <a:endParaRPr lang="en-US" dirty="0"/>
           </a:p>
@@ -3351,7 +3359,7 @@
           </a:lstStyle>
           <a:p>
             <a:r>
-              <a:rPr lang="en-US" smtClean="0"/>
+              <a:rPr lang="en-US"/>
               <a:t>Click to edit Master title style</a:t>
             </a:r>
             <a:endParaRPr lang="en-US" dirty="0"/>
@@ -3423,7 +3431,7 @@
           <a:p>
             <a:pPr lvl="0"/>
             <a:r>
-              <a:rPr lang="en-US" smtClean="0"/>
+              <a:rPr lang="en-US"/>
               <a:t>Edit Master text styles</a:t>
             </a:r>
           </a:p>
@@ -3453,35 +3461,35 @@
           <a:p>
             <a:pPr lvl="0"/>
             <a:r>
-              <a:rPr lang="en-US" smtClean="0"/>
+              <a:rPr lang="en-US"/>
               <a:t>Edit Master text styles</a:t>
             </a:r>
           </a:p>
           <a:p>
             <a:pPr lvl="1"/>
             <a:r>
-              <a:rPr lang="en-US" smtClean="0"/>
+              <a:rPr lang="en-US"/>
               <a:t>Second level</a:t>
             </a:r>
           </a:p>
           <a:p>
             <a:pPr lvl="2"/>
             <a:r>
-              <a:rPr lang="en-US" smtClean="0"/>
+              <a:rPr lang="en-US"/>
               <a:t>Third level</a:t>
             </a:r>
           </a:p>
           <a:p>
             <a:pPr lvl="3"/>
             <a:r>
-              <a:rPr lang="en-US" smtClean="0"/>
+              <a:rPr lang="en-US"/>
               <a:t>Fourth level</a:t>
             </a:r>
           </a:p>
           <a:p>
             <a:pPr lvl="4"/>
             <a:r>
-              <a:rPr lang="en-US" smtClean="0"/>
+              <a:rPr lang="en-US"/>
               <a:t>Fifth level</a:t>
             </a:r>
             <a:endParaRPr lang="en-US" dirty="0"/>
@@ -3553,7 +3561,7 @@
           <a:p>
             <a:pPr lvl="0"/>
             <a:r>
-              <a:rPr lang="en-US" smtClean="0"/>
+              <a:rPr lang="en-US"/>
               <a:t>Edit Master text styles</a:t>
             </a:r>
           </a:p>
@@ -3583,35 +3591,35 @@
           <a:p>
             <a:pPr lvl="0"/>
             <a:r>
-              <a:rPr lang="en-US" smtClean="0"/>
+              <a:rPr lang="en-US"/>
               <a:t>Edit Master text styles</a:t>
             </a:r>
           </a:p>
           <a:p>
             <a:pPr lvl="1"/>
             <a:r>
-              <a:rPr lang="en-US" smtClean="0"/>
+              <a:rPr lang="en-US"/>
               <a:t>Second level</a:t>
             </a:r>
           </a:p>
           <a:p>
             <a:pPr lvl="2"/>
             <a:r>
-              <a:rPr lang="en-US" smtClean="0"/>
+              <a:rPr lang="en-US"/>
               <a:t>Third level</a:t>
             </a:r>
           </a:p>
           <a:p>
             <a:pPr lvl="3"/>
             <a:r>
-              <a:rPr lang="en-US" smtClean="0"/>
+              <a:rPr lang="en-US"/>
               <a:t>Fourth level</a:t>
             </a:r>
           </a:p>
           <a:p>
             <a:pPr lvl="4"/>
             <a:r>
-              <a:rPr lang="en-US" smtClean="0"/>
+              <a:rPr lang="en-US"/>
               <a:t>Fifth level</a:t>
             </a:r>
             <a:endParaRPr lang="en-US" dirty="0"/>
@@ -3636,7 +3644,7 @@
             <a:fld id="{B61BEF0D-F0BB-DE4B-95CE-6DB70DBA9567}" type="datetimeFigureOut">
               <a:rPr lang="en-US" dirty="0"/>
               <a:pPr/>
-              <a:t>3/8/2019</a:t>
+              <a:t>2019-03-11</a:t>
             </a:fld>
             <a:endParaRPr lang="en-US" dirty="0"/>
           </a:p>
@@ -3726,7 +3734,7 @@
           <a:lstStyle/>
           <a:p>
             <a:r>
-              <a:rPr lang="en-US" smtClean="0"/>
+              <a:rPr lang="en-US"/>
               <a:t>Click to edit Master title style</a:t>
             </a:r>
             <a:endParaRPr lang="en-US" dirty="0"/>
@@ -3751,7 +3759,7 @@
             <a:fld id="{B61BEF0D-F0BB-DE4B-95CE-6DB70DBA9567}" type="datetimeFigureOut">
               <a:rPr lang="en-US" dirty="0"/>
               <a:pPr/>
-              <a:t>3/8/2019</a:t>
+              <a:t>2019-03-11</a:t>
             </a:fld>
             <a:endParaRPr lang="en-US" dirty="0"/>
           </a:p>
@@ -3843,7 +3851,7 @@
             <a:fld id="{B61BEF0D-F0BB-DE4B-95CE-6DB70DBA9567}" type="datetimeFigureOut">
               <a:rPr lang="en-US" dirty="0"/>
               <a:pPr/>
-              <a:t>3/8/2019</a:t>
+              <a:t>2019-03-11</a:t>
             </a:fld>
             <a:endParaRPr lang="en-US" dirty="0"/>
           </a:p>
@@ -3944,7 +3952,7 @@
           </a:lstStyle>
           <a:p>
             <a:r>
-              <a:rPr lang="en-US" smtClean="0"/>
+              <a:rPr lang="en-US"/>
               <a:t>Click to edit Master title style</a:t>
             </a:r>
             <a:endParaRPr lang="en-US" dirty="0"/>
@@ -3975,35 +3983,35 @@
           <a:p>
             <a:pPr lvl="0"/>
             <a:r>
-              <a:rPr lang="en-US" smtClean="0"/>
+              <a:rPr lang="en-US"/>
               <a:t>Edit Master text styles</a:t>
             </a:r>
           </a:p>
           <a:p>
             <a:pPr lvl="1"/>
             <a:r>
-              <a:rPr lang="en-US" smtClean="0"/>
+              <a:rPr lang="en-US"/>
               <a:t>Second level</a:t>
             </a:r>
           </a:p>
           <a:p>
             <a:pPr lvl="2"/>
             <a:r>
-              <a:rPr lang="en-US" smtClean="0"/>
+              <a:rPr lang="en-US"/>
               <a:t>Third level</a:t>
             </a:r>
           </a:p>
           <a:p>
             <a:pPr lvl="3"/>
             <a:r>
-              <a:rPr lang="en-US" smtClean="0"/>
+              <a:rPr lang="en-US"/>
               <a:t>Fourth level</a:t>
             </a:r>
           </a:p>
           <a:p>
             <a:pPr lvl="4"/>
             <a:r>
-              <a:rPr lang="en-US" smtClean="0"/>
+              <a:rPr lang="en-US"/>
               <a:t>Fifth level</a:t>
             </a:r>
             <a:endParaRPr lang="en-US" dirty="0"/>
@@ -4071,7 +4079,7 @@
           <a:p>
             <a:pPr lvl="0"/>
             <a:r>
-              <a:rPr lang="en-US" smtClean="0"/>
+              <a:rPr lang="en-US"/>
               <a:t>Edit Master text styles</a:t>
             </a:r>
           </a:p>
@@ -4095,7 +4103,7 @@
             <a:fld id="{B61BEF0D-F0BB-DE4B-95CE-6DB70DBA9567}" type="datetimeFigureOut">
               <a:rPr lang="en-US" dirty="0"/>
               <a:pPr/>
-              <a:t>3/8/2019</a:t>
+              <a:t>2019-03-11</a:t>
             </a:fld>
             <a:endParaRPr lang="en-US" dirty="0"/>
           </a:p>
@@ -4196,7 +4204,7 @@
           </a:lstStyle>
           <a:p>
             <a:r>
-              <a:rPr lang="en-US" smtClean="0"/>
+              <a:rPr lang="en-US"/>
               <a:t>Click to edit Master title style</a:t>
             </a:r>
             <a:endParaRPr lang="en-US" dirty="0"/>
@@ -4283,7 +4291,7 @@
           </a:lstStyle>
           <a:p>
             <a:r>
-              <a:rPr lang="en-US" smtClean="0"/>
+              <a:rPr lang="en-US"/>
               <a:t>Click icon to add picture</a:t>
             </a:r>
             <a:endParaRPr lang="en-US" dirty="0"/>
@@ -4351,7 +4359,7 @@
           <a:p>
             <a:pPr lvl="0"/>
             <a:r>
-              <a:rPr lang="en-US" smtClean="0"/>
+              <a:rPr lang="en-US"/>
               <a:t>Edit Master text styles</a:t>
             </a:r>
           </a:p>
@@ -4375,7 +4383,7 @@
             <a:fld id="{B61BEF0D-F0BB-DE4B-95CE-6DB70DBA9567}" type="datetimeFigureOut">
               <a:rPr lang="en-US" dirty="0"/>
               <a:pPr/>
-              <a:t>3/8/2019</a:t>
+              <a:t>2019-03-11</a:t>
             </a:fld>
             <a:endParaRPr lang="en-US" dirty="0"/>
           </a:p>
@@ -4671,7 +4679,7 @@
           <a:lstStyle/>
           <a:p>
             <a:r>
-              <a:rPr lang="en-US" smtClean="0"/>
+              <a:rPr lang="en-US"/>
               <a:t>Click to edit Master title style</a:t>
             </a:r>
             <a:endParaRPr lang="en-US" dirty="0"/>
@@ -4705,35 +4713,35 @@
           <a:p>
             <a:pPr lvl="0"/>
             <a:r>
-              <a:rPr lang="en-US" smtClean="0"/>
+              <a:rPr lang="en-US"/>
               <a:t>Edit Master text styles</a:t>
             </a:r>
           </a:p>
           <a:p>
             <a:pPr lvl="1"/>
             <a:r>
-              <a:rPr lang="en-US" smtClean="0"/>
+              <a:rPr lang="en-US"/>
               <a:t>Second level</a:t>
             </a:r>
           </a:p>
           <a:p>
             <a:pPr lvl="2"/>
             <a:r>
-              <a:rPr lang="en-US" smtClean="0"/>
+              <a:rPr lang="en-US"/>
               <a:t>Third level</a:t>
             </a:r>
           </a:p>
           <a:p>
             <a:pPr lvl="3"/>
             <a:r>
-              <a:rPr lang="en-US" smtClean="0"/>
+              <a:rPr lang="en-US"/>
               <a:t>Fourth level</a:t>
             </a:r>
           </a:p>
           <a:p>
             <a:pPr lvl="4"/>
             <a:r>
-              <a:rPr lang="en-US" smtClean="0"/>
+              <a:rPr lang="en-US"/>
               <a:t>Fifth level</a:t>
             </a:r>
             <a:endParaRPr lang="en-US" dirty="0"/>
@@ -4778,7 +4786,7 @@
             <a:fld id="{B61BEF0D-F0BB-DE4B-95CE-6DB70DBA9567}" type="datetimeFigureOut">
               <a:rPr lang="en-US" dirty="0"/>
               <a:pPr/>
-              <a:t>3/8/2019</a:t>
+              <a:t>2019-03-11</a:t>
             </a:fld>
             <a:endParaRPr lang="en-US" dirty="0"/>
           </a:p>
@@ -5319,35 +5327,82 @@
             <p:ph type="ctrTitle"/>
           </p:nvPr>
         </p:nvSpPr>
-        <p:spPr/>
-        <p:txBody>
-          <a:bodyPr/>
-          <a:lstStyle/>
-          <a:p>
-            <a:r>
-              <a:rPr lang="en-ZA" dirty="0" smtClean="0"/>
+        <p:spPr>
+          <a:xfrm>
+            <a:off x="684212" y="685799"/>
+            <a:ext cx="8001000" cy="790075"/>
+          </a:xfrm>
+        </p:spPr>
+        <p:txBody>
+          <a:bodyPr>
+            <a:normAutofit fontScale="90000"/>
+          </a:bodyPr>
+          <a:lstStyle/>
+          <a:p>
+            <a:r>
+              <a:rPr lang="en-ZA" dirty="0"/>
               <a:t>Learning Hub in Review</a:t>
             </a:r>
+          </a:p>
+        </p:txBody>
+      </p:sp>
+      <p:sp>
+        <p:nvSpPr>
+          <p:cNvPr id="3" name="Subtitle 2"/>
+          <p:cNvSpPr>
+            <a:spLocks noGrp="1"/>
+          </p:cNvSpPr>
+          <p:nvPr>
+            <p:ph type="subTitle" idx="1"/>
+          </p:nvPr>
+        </p:nvSpPr>
+        <p:spPr>
+          <a:xfrm>
+            <a:off x="684212" y="1475875"/>
+            <a:ext cx="6400800" cy="4315326"/>
+          </a:xfrm>
+        </p:spPr>
+        <p:txBody>
+          <a:bodyPr/>
+          <a:lstStyle/>
+          <a:p>
+            <a:r>
+              <a:rPr lang="en-ZA" dirty="0"/>
+              <a:t>Architecture</a:t>
+            </a:r>
+          </a:p>
+          <a:p>
+            <a:r>
+              <a:rPr lang="en-ZA" dirty="0"/>
+              <a:t>Tools</a:t>
+            </a:r>
+          </a:p>
+          <a:p>
+            <a:r>
+              <a:rPr lang="en-ZA" dirty="0"/>
+              <a:t>Decisions</a:t>
+            </a:r>
+          </a:p>
+          <a:p>
+            <a:r>
+              <a:rPr lang="en-ZA" dirty="0"/>
+              <a:t>1,2,3 Part Solutions</a:t>
+            </a:r>
+          </a:p>
+          <a:p>
             <a:endParaRPr lang="en-ZA" dirty="0"/>
           </a:p>
-        </p:txBody>
-      </p:sp>
-      <p:sp>
-        <p:nvSpPr>
-          <p:cNvPr id="3" name="Subtitle 2"/>
-          <p:cNvSpPr>
-            <a:spLocks noGrp="1"/>
-          </p:cNvSpPr>
-          <p:nvPr>
-            <p:ph type="subTitle" idx="1"/>
-          </p:nvPr>
-        </p:nvSpPr>
-        <p:spPr/>
-        <p:txBody>
-          <a:bodyPr/>
-          <a:lstStyle/>
-          <a:p>
-            <a:endParaRPr lang="en-ZA" dirty="0"/>
+          <a:p>
+            <a:r>
+              <a:rPr lang="en-ZA" dirty="0"/>
+              <a:t>Challenges Faced</a:t>
+            </a:r>
+          </a:p>
+          <a:p>
+            <a:r>
+              <a:rPr lang="en-ZA" dirty="0"/>
+              <a:t>Proposed Improvements</a:t>
+            </a:r>
           </a:p>
         </p:txBody>
       </p:sp>
@@ -5361,13 +5416,390 @@
   <p:clrMapOvr>
     <a:masterClrMapping/>
   </p:clrMapOvr>
-  <p:timing>
-    <p:tnLst>
-      <p:par>
-        <p:cTn id="1" dur="indefinite" restart="never" nodeType="tmRoot"/>
-      </p:par>
-    </p:tnLst>
-  </p:timing>
+</p:sld>
+</file>
+
+<file path=ppt/slides/slide2.xml><?xml version="1.0" encoding="utf-8"?>
+<p:sld xmlns:a="http://schemas.openxmlformats.org/drawingml/2006/main" xmlns:r="http://schemas.openxmlformats.org/officeDocument/2006/relationships" xmlns:p="http://schemas.openxmlformats.org/presentationml/2006/main">
+  <p:cSld>
+    <p:spTree>
+      <p:nvGrpSpPr>
+        <p:cNvPr id="1" name=""/>
+        <p:cNvGrpSpPr/>
+        <p:nvPr/>
+      </p:nvGrpSpPr>
+      <p:grpSpPr>
+        <a:xfrm>
+          <a:off x="0" y="0"/>
+          <a:ext cx="0" cy="0"/>
+          <a:chOff x="0" y="0"/>
+          <a:chExt cx="0" cy="0"/>
+        </a:xfrm>
+      </p:grpSpPr>
+      <p:sp>
+        <p:nvSpPr>
+          <p:cNvPr id="2" name="Title 1">
+            <a:extLst>
+              <a:ext uri="{FF2B5EF4-FFF2-40B4-BE49-F238E27FC236}">
+                <a16:creationId xmlns:a16="http://schemas.microsoft.com/office/drawing/2014/main" id="{C14D68B7-4022-4854-8A65-706A24BB3A74}"/>
+              </a:ext>
+            </a:extLst>
+          </p:cNvPr>
+          <p:cNvSpPr>
+            <a:spLocks noGrp="1"/>
+          </p:cNvSpPr>
+          <p:nvPr>
+            <p:ph type="title"/>
+          </p:nvPr>
+        </p:nvSpPr>
+        <p:spPr/>
+        <p:txBody>
+          <a:bodyPr/>
+          <a:lstStyle/>
+          <a:p>
+            <a:r>
+              <a:rPr lang="en-US" dirty="0"/>
+              <a:t>Architecture</a:t>
+            </a:r>
+            <a:endParaRPr lang="en-GB" dirty="0"/>
+          </a:p>
+        </p:txBody>
+      </p:sp>
+      <p:sp>
+        <p:nvSpPr>
+          <p:cNvPr id="3" name="Content Placeholder 2">
+            <a:extLst>
+              <a:ext uri="{FF2B5EF4-FFF2-40B4-BE49-F238E27FC236}">
+                <a16:creationId xmlns:a16="http://schemas.microsoft.com/office/drawing/2014/main" id="{56321C4E-200E-4B20-9702-88357B6FAF7D}"/>
+              </a:ext>
+            </a:extLst>
+          </p:cNvPr>
+          <p:cNvSpPr>
+            <a:spLocks noGrp="1"/>
+          </p:cNvSpPr>
+          <p:nvPr>
+            <p:ph idx="1"/>
+          </p:nvPr>
+        </p:nvSpPr>
+        <p:spPr/>
+        <p:txBody>
+          <a:bodyPr>
+            <a:normAutofit/>
+          </a:bodyPr>
+          <a:lstStyle/>
+          <a:p>
+            <a:r>
+              <a:rPr lang="en-US" b="1" dirty="0"/>
+              <a:t>Web:</a:t>
+            </a:r>
+            <a:r>
+              <a:rPr lang="en-US" dirty="0"/>
+              <a:t> This layer contains the </a:t>
+            </a:r>
+            <a:r>
+              <a:rPr lang="en-US" dirty="0" err="1"/>
+              <a:t>api</a:t>
+            </a:r>
+            <a:r>
+              <a:rPr lang="en-US" dirty="0"/>
+              <a:t> (ASP.NET Core).</a:t>
+            </a:r>
+          </a:p>
+          <a:p>
+            <a:r>
+              <a:rPr lang="en-US" b="1" dirty="0" err="1"/>
+              <a:t>IoC</a:t>
+            </a:r>
+            <a:r>
+              <a:rPr lang="en-US" b="1" dirty="0"/>
+              <a:t>:</a:t>
+            </a:r>
+            <a:r>
+              <a:rPr lang="en-US" dirty="0"/>
+              <a:t> This layer provides inversion of control registering services.</a:t>
+            </a:r>
+          </a:p>
+          <a:p>
+            <a:r>
+              <a:rPr lang="en-US" b="1" dirty="0"/>
+              <a:t>Application:</a:t>
+            </a:r>
+            <a:r>
+              <a:rPr lang="en-US" dirty="0"/>
+              <a:t> This layer is responsible for flow control. It does not contain business rules or domain logic.</a:t>
+            </a:r>
+          </a:p>
+          <a:p>
+            <a:r>
+              <a:rPr lang="en-US" b="1" dirty="0"/>
+              <a:t>Domain:</a:t>
+            </a:r>
+            <a:r>
+              <a:rPr lang="en-US" dirty="0"/>
+              <a:t> This layer contains business rules and domain logic.</a:t>
+            </a:r>
+          </a:p>
+          <a:p>
+            <a:r>
+              <a:rPr lang="en-US" b="1" dirty="0"/>
+              <a:t>Model:</a:t>
+            </a:r>
+            <a:r>
+              <a:rPr lang="en-US" dirty="0"/>
+              <a:t> This layer is responsible for modeling objects such as entities, models and </a:t>
+            </a:r>
+            <a:r>
+              <a:rPr lang="en-US" dirty="0" err="1"/>
+              <a:t>enums</a:t>
+            </a:r>
+            <a:r>
+              <a:rPr lang="en-US" dirty="0"/>
+              <a:t>.</a:t>
+            </a:r>
+          </a:p>
+          <a:p>
+            <a:r>
+              <a:rPr lang="en-US" b="1" dirty="0"/>
+              <a:t>Database:</a:t>
+            </a:r>
+            <a:r>
+              <a:rPr lang="en-US" dirty="0"/>
+              <a:t> This layer isolates and abstracts the data persistence.</a:t>
+            </a:r>
+          </a:p>
+        </p:txBody>
+      </p:sp>
+    </p:spTree>
+    <p:extLst>
+      <p:ext uri="{BB962C8B-B14F-4D97-AF65-F5344CB8AC3E}">
+        <p14:creationId xmlns:p14="http://schemas.microsoft.com/office/powerpoint/2010/main" val="677472459"/>
+      </p:ext>
+    </p:extLst>
+  </p:cSld>
+  <p:clrMapOvr>
+    <a:masterClrMapping/>
+  </p:clrMapOvr>
+</p:sld>
+</file>
+
+<file path=ppt/slides/slide3.xml><?xml version="1.0" encoding="utf-8"?>
+<p:sld xmlns:a="http://schemas.openxmlformats.org/drawingml/2006/main" xmlns:r="http://schemas.openxmlformats.org/officeDocument/2006/relationships" xmlns:p="http://schemas.openxmlformats.org/presentationml/2006/main">
+  <p:cSld>
+    <p:spTree>
+      <p:nvGrpSpPr>
+        <p:cNvPr id="1" name=""/>
+        <p:cNvGrpSpPr/>
+        <p:nvPr/>
+      </p:nvGrpSpPr>
+      <p:grpSpPr>
+        <a:xfrm>
+          <a:off x="0" y="0"/>
+          <a:ext cx="0" cy="0"/>
+          <a:chOff x="0" y="0"/>
+          <a:chExt cx="0" cy="0"/>
+        </a:xfrm>
+      </p:grpSpPr>
+      <p:sp>
+        <p:nvSpPr>
+          <p:cNvPr id="2" name="Title 1">
+            <a:extLst>
+              <a:ext uri="{FF2B5EF4-FFF2-40B4-BE49-F238E27FC236}">
+                <a16:creationId xmlns:a16="http://schemas.microsoft.com/office/drawing/2014/main" id="{97D50AFA-205D-43AA-AC16-9D695A88384B}"/>
+              </a:ext>
+            </a:extLst>
+          </p:cNvPr>
+          <p:cNvSpPr>
+            <a:spLocks noGrp="1"/>
+          </p:cNvSpPr>
+          <p:nvPr>
+            <p:ph type="title"/>
+          </p:nvPr>
+        </p:nvSpPr>
+        <p:spPr/>
+        <p:txBody>
+          <a:bodyPr/>
+          <a:lstStyle/>
+          <a:p>
+            <a:r>
+              <a:rPr lang="en-US" dirty="0"/>
+              <a:t>Tools</a:t>
+            </a:r>
+            <a:endParaRPr lang="en-GB" dirty="0"/>
+          </a:p>
+        </p:txBody>
+      </p:sp>
+      <p:sp>
+        <p:nvSpPr>
+          <p:cNvPr id="3" name="Content Placeholder 2">
+            <a:extLst>
+              <a:ext uri="{FF2B5EF4-FFF2-40B4-BE49-F238E27FC236}">
+                <a16:creationId xmlns:a16="http://schemas.microsoft.com/office/drawing/2014/main" id="{C29A6FDF-7874-4046-A1E7-A88C9445DC7C}"/>
+              </a:ext>
+            </a:extLst>
+          </p:cNvPr>
+          <p:cNvSpPr>
+            <a:spLocks noGrp="1"/>
+          </p:cNvSpPr>
+          <p:nvPr>
+            <p:ph idx="1"/>
+          </p:nvPr>
+        </p:nvSpPr>
+        <p:spPr/>
+        <p:txBody>
+          <a:bodyPr/>
+          <a:lstStyle/>
+          <a:p>
+            <a:endParaRPr lang="en-US" dirty="0"/>
+          </a:p>
+          <a:p>
+            <a:r>
+              <a:rPr lang="en-GB" dirty="0" err="1"/>
+              <a:t>DotNetCore</a:t>
+            </a:r>
+            <a:endParaRPr lang="en-GB" dirty="0"/>
+          </a:p>
+          <a:p>
+            <a:r>
+              <a:rPr lang="en-GB" dirty="0" err="1"/>
+              <a:t>Microsoft.EntityFrameWorkCore</a:t>
+            </a:r>
+            <a:endParaRPr lang="en-GB" dirty="0"/>
+          </a:p>
+          <a:p>
+            <a:r>
+              <a:rPr lang="en-US" dirty="0" err="1"/>
+              <a:t>Microsoft.Azure.ServiceBus</a:t>
+            </a:r>
+            <a:endParaRPr lang="en-US" dirty="0"/>
+          </a:p>
+          <a:p>
+            <a:r>
+              <a:rPr lang="en-US" dirty="0" err="1"/>
+              <a:t>NewtonSoft.Json</a:t>
+            </a:r>
+            <a:endParaRPr lang="en-US" dirty="0"/>
+          </a:p>
+          <a:p>
+            <a:r>
+              <a:rPr lang="en-GB" dirty="0" err="1"/>
+              <a:t>Microsoft.Extensions.Caching.Memory</a:t>
+            </a:r>
+            <a:endParaRPr lang="en-US" dirty="0"/>
+          </a:p>
+        </p:txBody>
+      </p:sp>
+    </p:spTree>
+    <p:extLst>
+      <p:ext uri="{BB962C8B-B14F-4D97-AF65-F5344CB8AC3E}">
+        <p14:creationId xmlns:p14="http://schemas.microsoft.com/office/powerpoint/2010/main" val="1473715344"/>
+      </p:ext>
+    </p:extLst>
+  </p:cSld>
+  <p:clrMapOvr>
+    <a:masterClrMapping/>
+  </p:clrMapOvr>
+</p:sld>
+</file>
+
+<file path=ppt/slides/slide4.xml><?xml version="1.0" encoding="utf-8"?>
+<p:sld xmlns:a="http://schemas.openxmlformats.org/drawingml/2006/main" xmlns:r="http://schemas.openxmlformats.org/officeDocument/2006/relationships" xmlns:p="http://schemas.openxmlformats.org/presentationml/2006/main">
+  <p:cSld>
+    <p:spTree>
+      <p:nvGrpSpPr>
+        <p:cNvPr id="1" name=""/>
+        <p:cNvGrpSpPr/>
+        <p:nvPr/>
+      </p:nvGrpSpPr>
+      <p:grpSpPr>
+        <a:xfrm>
+          <a:off x="0" y="0"/>
+          <a:ext cx="0" cy="0"/>
+          <a:chOff x="0" y="0"/>
+          <a:chExt cx="0" cy="0"/>
+        </a:xfrm>
+      </p:grpSpPr>
+      <p:sp>
+        <p:nvSpPr>
+          <p:cNvPr id="2" name="Title 1">
+            <a:extLst>
+              <a:ext uri="{FF2B5EF4-FFF2-40B4-BE49-F238E27FC236}">
+                <a16:creationId xmlns:a16="http://schemas.microsoft.com/office/drawing/2014/main" id="{72E758C5-BEA1-435C-82FB-428A47C1CF05}"/>
+              </a:ext>
+            </a:extLst>
+          </p:cNvPr>
+          <p:cNvSpPr>
+            <a:spLocks noGrp="1"/>
+          </p:cNvSpPr>
+          <p:nvPr>
+            <p:ph type="title"/>
+          </p:nvPr>
+        </p:nvSpPr>
+        <p:spPr/>
+        <p:txBody>
+          <a:bodyPr/>
+          <a:lstStyle/>
+          <a:p>
+            <a:r>
+              <a:rPr lang="en-US" dirty="0"/>
+              <a:t>Improvements</a:t>
+            </a:r>
+            <a:endParaRPr lang="en-GB" dirty="0"/>
+          </a:p>
+        </p:txBody>
+      </p:sp>
+      <p:sp>
+        <p:nvSpPr>
+          <p:cNvPr id="3" name="Content Placeholder 2">
+            <a:extLst>
+              <a:ext uri="{FF2B5EF4-FFF2-40B4-BE49-F238E27FC236}">
+                <a16:creationId xmlns:a16="http://schemas.microsoft.com/office/drawing/2014/main" id="{336B8FFB-9113-47D6-BD7F-8ABC00149780}"/>
+              </a:ext>
+            </a:extLst>
+          </p:cNvPr>
+          <p:cNvSpPr>
+            <a:spLocks noGrp="1"/>
+          </p:cNvSpPr>
+          <p:nvPr>
+            <p:ph idx="1"/>
+          </p:nvPr>
+        </p:nvSpPr>
+        <p:spPr/>
+        <p:txBody>
+          <a:bodyPr/>
+          <a:lstStyle/>
+          <a:p>
+            <a:r>
+              <a:rPr lang="en-US" dirty="0"/>
+              <a:t>Change Architecture</a:t>
+            </a:r>
+          </a:p>
+          <a:p>
+            <a:r>
+              <a:rPr lang="en-US" dirty="0"/>
+              <a:t>Don’t use </a:t>
+            </a:r>
+            <a:r>
+              <a:rPr lang="en-US" dirty="0" err="1"/>
+              <a:t>nuget</a:t>
+            </a:r>
+            <a:r>
+              <a:rPr lang="en-US" dirty="0"/>
+              <a:t> package</a:t>
+            </a:r>
+            <a:endParaRPr lang="en-GB" dirty="0"/>
+          </a:p>
+        </p:txBody>
+      </p:sp>
+    </p:spTree>
+    <p:extLst>
+      <p:ext uri="{BB962C8B-B14F-4D97-AF65-F5344CB8AC3E}">
+        <p14:creationId xmlns:p14="http://schemas.microsoft.com/office/powerpoint/2010/main" val="3682905894"/>
+      </p:ext>
+    </p:extLst>
+  </p:cSld>
+  <p:clrMapOvr>
+    <a:masterClrMapping/>
+  </p:clrMapOvr>
 </p:sld>
 </file>
 

</xml_diff>

<commit_message>
Busy with presentation: Decisions
</commit_message>
<xml_diff>
--- a/LearningHubInReview.pptx
+++ b/LearningHubInReview.pptx
@@ -8,7 +8,12 @@
     <p:sldId id="256" r:id="rId2"/>
     <p:sldId id="257" r:id="rId3"/>
     <p:sldId id="259" r:id="rId4"/>
-    <p:sldId id="258" r:id="rId5"/>
+    <p:sldId id="260" r:id="rId5"/>
+    <p:sldId id="261" r:id="rId6"/>
+    <p:sldId id="262" r:id="rId7"/>
+    <p:sldId id="263" r:id="rId8"/>
+    <p:sldId id="264" r:id="rId9"/>
+    <p:sldId id="258" r:id="rId10"/>
   </p:sldIdLst>
   <p:sldSz cx="12192000" cy="6858000"/>
   <p:notesSz cx="6858000" cy="9144000"/>
@@ -307,7 +312,7 @@
             <a:fld id="{B61BEF0D-F0BB-DE4B-95CE-6DB70DBA9567}" type="datetimeFigureOut">
               <a:rPr lang="en-US" dirty="0"/>
               <a:pPr/>
-              <a:t>2019-03-11</a:t>
+              <a:t>3/12/2019</a:t>
             </a:fld>
             <a:endParaRPr lang="en-US" dirty="0"/>
           </a:p>
@@ -740,7 +745,7 @@
             <a:fld id="{B61BEF0D-F0BB-DE4B-95CE-6DB70DBA9567}" type="datetimeFigureOut">
               <a:rPr lang="en-US" dirty="0"/>
               <a:pPr/>
-              <a:t>2019-03-11</a:t>
+              <a:t>3/12/2019</a:t>
             </a:fld>
             <a:endParaRPr lang="en-US" dirty="0"/>
           </a:p>
@@ -987,7 +992,7 @@
             <a:fld id="{B61BEF0D-F0BB-DE4B-95CE-6DB70DBA9567}" type="datetimeFigureOut">
               <a:rPr lang="en-US" dirty="0"/>
               <a:pPr/>
-              <a:t>2019-03-11</a:t>
+              <a:t>3/12/2019</a:t>
             </a:fld>
             <a:endParaRPr lang="en-US" dirty="0"/>
           </a:p>
@@ -1292,7 +1297,7 @@
             <a:fld id="{B61BEF0D-F0BB-DE4B-95CE-6DB70DBA9567}" type="datetimeFigureOut">
               <a:rPr lang="en-US" dirty="0"/>
               <a:pPr/>
-              <a:t>2019-03-11</a:t>
+              <a:t>3/12/2019</a:t>
             </a:fld>
             <a:endParaRPr lang="en-US" dirty="0"/>
           </a:p>
@@ -1607,7 +1612,7 @@
             <a:fld id="{B61BEF0D-F0BB-DE4B-95CE-6DB70DBA9567}" type="datetimeFigureOut">
               <a:rPr lang="en-US" dirty="0"/>
               <a:pPr/>
-              <a:t>2019-03-11</a:t>
+              <a:t>3/12/2019</a:t>
             </a:fld>
             <a:endParaRPr lang="en-US" dirty="0"/>
           </a:p>
@@ -1906,7 +1911,7 @@
             <a:fld id="{B61BEF0D-F0BB-DE4B-95CE-6DB70DBA9567}" type="datetimeFigureOut">
               <a:rPr lang="en-US" dirty="0"/>
               <a:pPr/>
-              <a:t>2019-03-11</a:t>
+              <a:t>3/12/2019</a:t>
             </a:fld>
             <a:endParaRPr lang="en-US" dirty="0"/>
           </a:p>
@@ -2270,7 +2275,7 @@
             <a:fld id="{B61BEF0D-F0BB-DE4B-95CE-6DB70DBA9567}" type="datetimeFigureOut">
               <a:rPr lang="en-US" dirty="0"/>
               <a:pPr/>
-              <a:t>2019-03-11</a:t>
+              <a:t>3/12/2019</a:t>
             </a:fld>
             <a:endParaRPr lang="en-US" dirty="0"/>
           </a:p>
@@ -2441,7 +2446,7 @@
             <a:fld id="{B61BEF0D-F0BB-DE4B-95CE-6DB70DBA9567}" type="datetimeFigureOut">
               <a:rPr lang="en-US" dirty="0"/>
               <a:pPr/>
-              <a:t>2019-03-11</a:t>
+              <a:t>3/12/2019</a:t>
             </a:fld>
             <a:endParaRPr lang="en-US" dirty="0"/>
           </a:p>
@@ -2618,7 +2623,7 @@
             <a:fld id="{B61BEF0D-F0BB-DE4B-95CE-6DB70DBA9567}" type="datetimeFigureOut">
               <a:rPr lang="en-US" dirty="0"/>
               <a:pPr/>
-              <a:t>2019-03-11</a:t>
+              <a:t>3/12/2019</a:t>
             </a:fld>
             <a:endParaRPr lang="en-US" dirty="0"/>
           </a:p>
@@ -2785,7 +2790,7 @@
             <a:fld id="{B61BEF0D-F0BB-DE4B-95CE-6DB70DBA9567}" type="datetimeFigureOut">
               <a:rPr lang="en-US" dirty="0"/>
               <a:pPr/>
-              <a:t>2019-03-11</a:t>
+              <a:t>3/12/2019</a:t>
             </a:fld>
             <a:endParaRPr lang="en-US" dirty="0"/>
           </a:p>
@@ -3032,7 +3037,7 @@
             <a:fld id="{B61BEF0D-F0BB-DE4B-95CE-6DB70DBA9567}" type="datetimeFigureOut">
               <a:rPr lang="en-US" dirty="0"/>
               <a:pPr/>
-              <a:t>2019-03-11</a:t>
+              <a:t>3/12/2019</a:t>
             </a:fld>
             <a:endParaRPr lang="en-US" dirty="0"/>
           </a:p>
@@ -3265,7 +3270,7 @@
             <a:fld id="{B61BEF0D-F0BB-DE4B-95CE-6DB70DBA9567}" type="datetimeFigureOut">
               <a:rPr lang="en-US" dirty="0"/>
               <a:pPr/>
-              <a:t>2019-03-11</a:t>
+              <a:t>3/12/2019</a:t>
             </a:fld>
             <a:endParaRPr lang="en-US" dirty="0"/>
           </a:p>
@@ -3644,7 +3649,7 @@
             <a:fld id="{B61BEF0D-F0BB-DE4B-95CE-6DB70DBA9567}" type="datetimeFigureOut">
               <a:rPr lang="en-US" dirty="0"/>
               <a:pPr/>
-              <a:t>2019-03-11</a:t>
+              <a:t>3/12/2019</a:t>
             </a:fld>
             <a:endParaRPr lang="en-US" dirty="0"/>
           </a:p>
@@ -3759,7 +3764,7 @@
             <a:fld id="{B61BEF0D-F0BB-DE4B-95CE-6DB70DBA9567}" type="datetimeFigureOut">
               <a:rPr lang="en-US" dirty="0"/>
               <a:pPr/>
-              <a:t>2019-03-11</a:t>
+              <a:t>3/12/2019</a:t>
             </a:fld>
             <a:endParaRPr lang="en-US" dirty="0"/>
           </a:p>
@@ -3851,7 +3856,7 @@
             <a:fld id="{B61BEF0D-F0BB-DE4B-95CE-6DB70DBA9567}" type="datetimeFigureOut">
               <a:rPr lang="en-US" dirty="0"/>
               <a:pPr/>
-              <a:t>2019-03-11</a:t>
+              <a:t>3/12/2019</a:t>
             </a:fld>
             <a:endParaRPr lang="en-US" dirty="0"/>
           </a:p>
@@ -4103,7 +4108,7 @@
             <a:fld id="{B61BEF0D-F0BB-DE4B-95CE-6DB70DBA9567}" type="datetimeFigureOut">
               <a:rPr lang="en-US" dirty="0"/>
               <a:pPr/>
-              <a:t>2019-03-11</a:t>
+              <a:t>3/12/2019</a:t>
             </a:fld>
             <a:endParaRPr lang="en-US" dirty="0"/>
           </a:p>
@@ -4383,7 +4388,7 @@
             <a:fld id="{B61BEF0D-F0BB-DE4B-95CE-6DB70DBA9567}" type="datetimeFigureOut">
               <a:rPr lang="en-US" dirty="0"/>
               <a:pPr/>
-              <a:t>2019-03-11</a:t>
+              <a:t>3/12/2019</a:t>
             </a:fld>
             <a:endParaRPr lang="en-US" dirty="0"/>
           </a:p>
@@ -4786,7 +4791,7 @@
             <a:fld id="{B61BEF0D-F0BB-DE4B-95CE-6DB70DBA9567}" type="datetimeFigureOut">
               <a:rPr lang="en-US" dirty="0"/>
               <a:pPr/>
-              <a:t>2019-03-11</a:t>
+              <a:t>3/12/2019</a:t>
             </a:fld>
             <a:endParaRPr lang="en-US" dirty="0"/>
           </a:p>
@@ -5416,6 +5421,13 @@
   <p:clrMapOvr>
     <a:masterClrMapping/>
   </p:clrMapOvr>
+  <p:timing>
+    <p:tnLst>
+      <p:par>
+        <p:cTn id="1" dur="indefinite" restart="never" nodeType="tmRoot"/>
+      </p:par>
+    </p:tnLst>
+  </p:timing>
 </p:sld>
 </file>
 
@@ -5698,6 +5710,13 @@
   <p:clrMapOvr>
     <a:masterClrMapping/>
   </p:clrMapOvr>
+  <p:timing>
+    <p:tnLst>
+      <p:par>
+        <p:cTn id="1" dur="indefinite" restart="never" nodeType="tmRoot"/>
+      </p:par>
+    </p:tnLst>
+  </p:timing>
 </p:sld>
 </file>
 
@@ -5720,6 +5739,417 @@
       </p:grpSpPr>
       <p:sp>
         <p:nvSpPr>
+          <p:cNvPr id="2" name="Title 1"/>
+          <p:cNvSpPr>
+            <a:spLocks noGrp="1"/>
+          </p:cNvSpPr>
+          <p:nvPr>
+            <p:ph type="title"/>
+          </p:nvPr>
+        </p:nvSpPr>
+        <p:spPr/>
+        <p:txBody>
+          <a:bodyPr/>
+          <a:lstStyle/>
+          <a:p>
+            <a:r>
+              <a:rPr lang="en-ZA" dirty="0" smtClean="0"/>
+              <a:t>Decisions</a:t>
+            </a:r>
+            <a:endParaRPr lang="en-ZA" dirty="0"/>
+          </a:p>
+        </p:txBody>
+      </p:sp>
+      <p:sp>
+        <p:nvSpPr>
+          <p:cNvPr id="3" name="Content Placeholder 2"/>
+          <p:cNvSpPr>
+            <a:spLocks noGrp="1"/>
+          </p:cNvSpPr>
+          <p:nvPr>
+            <p:ph idx="1"/>
+          </p:nvPr>
+        </p:nvSpPr>
+        <p:spPr/>
+        <p:txBody>
+          <a:bodyPr/>
+          <a:lstStyle/>
+          <a:p>
+            <a:r>
+              <a:rPr lang="en-ZA" dirty="0" smtClean="0"/>
+              <a:t>.NET </a:t>
+            </a:r>
+            <a:r>
+              <a:rPr lang="en-ZA" dirty="0" smtClean="0"/>
+              <a:t>Core supports high performance and scalable systems.</a:t>
+            </a:r>
+          </a:p>
+          <a:p>
+            <a:endParaRPr lang="en-ZA" dirty="0" smtClean="0"/>
+          </a:p>
+          <a:p>
+            <a:endParaRPr lang="en-ZA" dirty="0"/>
+          </a:p>
+        </p:txBody>
+      </p:sp>
+    </p:spTree>
+    <p:extLst>
+      <p:ext uri="{BB962C8B-B14F-4D97-AF65-F5344CB8AC3E}">
+        <p14:creationId xmlns:p14="http://schemas.microsoft.com/office/powerpoint/2010/main" val="1075316040"/>
+      </p:ext>
+    </p:extLst>
+  </p:cSld>
+  <p:clrMapOvr>
+    <a:masterClrMapping/>
+  </p:clrMapOvr>
+  <p:timing>
+    <p:tnLst>
+      <p:par>
+        <p:cTn id="1" dur="indefinite" restart="never" nodeType="tmRoot"/>
+      </p:par>
+    </p:tnLst>
+  </p:timing>
+</p:sld>
+</file>
+
+<file path=ppt/slides/slide5.xml><?xml version="1.0" encoding="utf-8"?>
+<p:sld xmlns:a="http://schemas.openxmlformats.org/drawingml/2006/main" xmlns:r="http://schemas.openxmlformats.org/officeDocument/2006/relationships" xmlns:p="http://schemas.openxmlformats.org/presentationml/2006/main">
+  <p:cSld>
+    <p:spTree>
+      <p:nvGrpSpPr>
+        <p:cNvPr id="1" name=""/>
+        <p:cNvGrpSpPr/>
+        <p:nvPr/>
+      </p:nvGrpSpPr>
+      <p:grpSpPr>
+        <a:xfrm>
+          <a:off x="0" y="0"/>
+          <a:ext cx="0" cy="0"/>
+          <a:chOff x="0" y="0"/>
+          <a:chExt cx="0" cy="0"/>
+        </a:xfrm>
+      </p:grpSpPr>
+      <p:sp>
+        <p:nvSpPr>
+          <p:cNvPr id="2" name="Title 1"/>
+          <p:cNvSpPr>
+            <a:spLocks noGrp="1"/>
+          </p:cNvSpPr>
+          <p:nvPr>
+            <p:ph type="title"/>
+          </p:nvPr>
+        </p:nvSpPr>
+        <p:spPr/>
+        <p:txBody>
+          <a:bodyPr/>
+          <a:lstStyle/>
+          <a:p>
+            <a:r>
+              <a:rPr lang="en-ZA" dirty="0" smtClean="0"/>
+              <a:t>Solving Part 1</a:t>
+            </a:r>
+            <a:endParaRPr lang="en-ZA" dirty="0"/>
+          </a:p>
+        </p:txBody>
+      </p:sp>
+      <p:sp>
+        <p:nvSpPr>
+          <p:cNvPr id="3" name="Content Placeholder 2"/>
+          <p:cNvSpPr>
+            <a:spLocks noGrp="1"/>
+          </p:cNvSpPr>
+          <p:nvPr>
+            <p:ph idx="1"/>
+          </p:nvPr>
+        </p:nvSpPr>
+        <p:spPr/>
+        <p:txBody>
+          <a:bodyPr/>
+          <a:lstStyle/>
+          <a:p>
+            <a:endParaRPr lang="en-ZA"/>
+          </a:p>
+        </p:txBody>
+      </p:sp>
+    </p:spTree>
+    <p:extLst>
+      <p:ext uri="{BB962C8B-B14F-4D97-AF65-F5344CB8AC3E}">
+        <p14:creationId xmlns:p14="http://schemas.microsoft.com/office/powerpoint/2010/main" val="4143056688"/>
+      </p:ext>
+    </p:extLst>
+  </p:cSld>
+  <p:clrMapOvr>
+    <a:masterClrMapping/>
+  </p:clrMapOvr>
+  <p:timing>
+    <p:tnLst>
+      <p:par>
+        <p:cTn id="1" dur="indefinite" restart="never" nodeType="tmRoot"/>
+      </p:par>
+    </p:tnLst>
+  </p:timing>
+</p:sld>
+</file>
+
+<file path=ppt/slides/slide6.xml><?xml version="1.0" encoding="utf-8"?>
+<p:sld xmlns:a="http://schemas.openxmlformats.org/drawingml/2006/main" xmlns:r="http://schemas.openxmlformats.org/officeDocument/2006/relationships" xmlns:p="http://schemas.openxmlformats.org/presentationml/2006/main">
+  <p:cSld>
+    <p:spTree>
+      <p:nvGrpSpPr>
+        <p:cNvPr id="1" name=""/>
+        <p:cNvGrpSpPr/>
+        <p:nvPr/>
+      </p:nvGrpSpPr>
+      <p:grpSpPr>
+        <a:xfrm>
+          <a:off x="0" y="0"/>
+          <a:ext cx="0" cy="0"/>
+          <a:chOff x="0" y="0"/>
+          <a:chExt cx="0" cy="0"/>
+        </a:xfrm>
+      </p:grpSpPr>
+      <p:sp>
+        <p:nvSpPr>
+          <p:cNvPr id="2" name="Title 1"/>
+          <p:cNvSpPr>
+            <a:spLocks noGrp="1"/>
+          </p:cNvSpPr>
+          <p:nvPr>
+            <p:ph type="title"/>
+          </p:nvPr>
+        </p:nvSpPr>
+        <p:spPr/>
+        <p:txBody>
+          <a:bodyPr/>
+          <a:lstStyle/>
+          <a:p>
+            <a:r>
+              <a:rPr lang="en-ZA" dirty="0" smtClean="0"/>
+              <a:t>Solving Part 2</a:t>
+            </a:r>
+            <a:endParaRPr lang="en-ZA" dirty="0"/>
+          </a:p>
+        </p:txBody>
+      </p:sp>
+      <p:sp>
+        <p:nvSpPr>
+          <p:cNvPr id="3" name="Content Placeholder 2"/>
+          <p:cNvSpPr>
+            <a:spLocks noGrp="1"/>
+          </p:cNvSpPr>
+          <p:nvPr>
+            <p:ph idx="1"/>
+          </p:nvPr>
+        </p:nvSpPr>
+        <p:spPr/>
+        <p:txBody>
+          <a:bodyPr/>
+          <a:lstStyle/>
+          <a:p>
+            <a:endParaRPr lang="en-ZA"/>
+          </a:p>
+        </p:txBody>
+      </p:sp>
+    </p:spTree>
+    <p:extLst>
+      <p:ext uri="{BB962C8B-B14F-4D97-AF65-F5344CB8AC3E}">
+        <p14:creationId xmlns:p14="http://schemas.microsoft.com/office/powerpoint/2010/main" val="1671355150"/>
+      </p:ext>
+    </p:extLst>
+  </p:cSld>
+  <p:clrMapOvr>
+    <a:masterClrMapping/>
+  </p:clrMapOvr>
+  <p:timing>
+    <p:tnLst>
+      <p:par>
+        <p:cTn id="1" dur="indefinite" restart="never" nodeType="tmRoot"/>
+      </p:par>
+    </p:tnLst>
+  </p:timing>
+</p:sld>
+</file>
+
+<file path=ppt/slides/slide7.xml><?xml version="1.0" encoding="utf-8"?>
+<p:sld xmlns:a="http://schemas.openxmlformats.org/drawingml/2006/main" xmlns:r="http://schemas.openxmlformats.org/officeDocument/2006/relationships" xmlns:p="http://schemas.openxmlformats.org/presentationml/2006/main">
+  <p:cSld>
+    <p:spTree>
+      <p:nvGrpSpPr>
+        <p:cNvPr id="1" name=""/>
+        <p:cNvGrpSpPr/>
+        <p:nvPr/>
+      </p:nvGrpSpPr>
+      <p:grpSpPr>
+        <a:xfrm>
+          <a:off x="0" y="0"/>
+          <a:ext cx="0" cy="0"/>
+          <a:chOff x="0" y="0"/>
+          <a:chExt cx="0" cy="0"/>
+        </a:xfrm>
+      </p:grpSpPr>
+      <p:sp>
+        <p:nvSpPr>
+          <p:cNvPr id="2" name="Title 1"/>
+          <p:cNvSpPr>
+            <a:spLocks noGrp="1"/>
+          </p:cNvSpPr>
+          <p:nvPr>
+            <p:ph type="title"/>
+          </p:nvPr>
+        </p:nvSpPr>
+        <p:spPr/>
+        <p:txBody>
+          <a:bodyPr/>
+          <a:lstStyle/>
+          <a:p>
+            <a:r>
+              <a:rPr lang="en-ZA" dirty="0" smtClean="0"/>
+              <a:t>Solving Part 3</a:t>
+            </a:r>
+            <a:endParaRPr lang="en-ZA" dirty="0"/>
+          </a:p>
+        </p:txBody>
+      </p:sp>
+      <p:sp>
+        <p:nvSpPr>
+          <p:cNvPr id="3" name="Content Placeholder 2"/>
+          <p:cNvSpPr>
+            <a:spLocks noGrp="1"/>
+          </p:cNvSpPr>
+          <p:nvPr>
+            <p:ph idx="1"/>
+          </p:nvPr>
+        </p:nvSpPr>
+        <p:spPr/>
+        <p:txBody>
+          <a:bodyPr/>
+          <a:lstStyle/>
+          <a:p>
+            <a:endParaRPr lang="en-ZA"/>
+          </a:p>
+        </p:txBody>
+      </p:sp>
+    </p:spTree>
+    <p:extLst>
+      <p:ext uri="{BB962C8B-B14F-4D97-AF65-F5344CB8AC3E}">
+        <p14:creationId xmlns:p14="http://schemas.microsoft.com/office/powerpoint/2010/main" val="2377165425"/>
+      </p:ext>
+    </p:extLst>
+  </p:cSld>
+  <p:clrMapOvr>
+    <a:masterClrMapping/>
+  </p:clrMapOvr>
+  <p:timing>
+    <p:tnLst>
+      <p:par>
+        <p:cTn id="1" dur="indefinite" restart="never" nodeType="tmRoot"/>
+      </p:par>
+    </p:tnLst>
+  </p:timing>
+</p:sld>
+</file>
+
+<file path=ppt/slides/slide8.xml><?xml version="1.0" encoding="utf-8"?>
+<p:sld xmlns:a="http://schemas.openxmlformats.org/drawingml/2006/main" xmlns:r="http://schemas.openxmlformats.org/officeDocument/2006/relationships" xmlns:p="http://schemas.openxmlformats.org/presentationml/2006/main">
+  <p:cSld>
+    <p:spTree>
+      <p:nvGrpSpPr>
+        <p:cNvPr id="1" name=""/>
+        <p:cNvGrpSpPr/>
+        <p:nvPr/>
+      </p:nvGrpSpPr>
+      <p:grpSpPr>
+        <a:xfrm>
+          <a:off x="0" y="0"/>
+          <a:ext cx="0" cy="0"/>
+          <a:chOff x="0" y="0"/>
+          <a:chExt cx="0" cy="0"/>
+        </a:xfrm>
+      </p:grpSpPr>
+      <p:sp>
+        <p:nvSpPr>
+          <p:cNvPr id="2" name="Title 1"/>
+          <p:cNvSpPr>
+            <a:spLocks noGrp="1"/>
+          </p:cNvSpPr>
+          <p:nvPr>
+            <p:ph type="title"/>
+          </p:nvPr>
+        </p:nvSpPr>
+        <p:spPr/>
+        <p:txBody>
+          <a:bodyPr/>
+          <a:lstStyle/>
+          <a:p>
+            <a:r>
+              <a:rPr lang="en-ZA" dirty="0" smtClean="0"/>
+              <a:t>Problems </a:t>
+            </a:r>
+            <a:r>
+              <a:rPr lang="en-ZA" dirty="0"/>
+              <a:t>and Challenges</a:t>
+            </a:r>
+          </a:p>
+        </p:txBody>
+      </p:sp>
+      <p:sp>
+        <p:nvSpPr>
+          <p:cNvPr id="3" name="Content Placeholder 2"/>
+          <p:cNvSpPr>
+            <a:spLocks noGrp="1"/>
+          </p:cNvSpPr>
+          <p:nvPr>
+            <p:ph idx="1"/>
+          </p:nvPr>
+        </p:nvSpPr>
+        <p:spPr/>
+        <p:txBody>
+          <a:bodyPr/>
+          <a:lstStyle/>
+          <a:p>
+            <a:endParaRPr lang="en-ZA"/>
+          </a:p>
+        </p:txBody>
+      </p:sp>
+    </p:spTree>
+    <p:extLst>
+      <p:ext uri="{BB962C8B-B14F-4D97-AF65-F5344CB8AC3E}">
+        <p14:creationId xmlns:p14="http://schemas.microsoft.com/office/powerpoint/2010/main" val="3182702612"/>
+      </p:ext>
+    </p:extLst>
+  </p:cSld>
+  <p:clrMapOvr>
+    <a:masterClrMapping/>
+  </p:clrMapOvr>
+  <p:timing>
+    <p:tnLst>
+      <p:par>
+        <p:cTn id="1" dur="indefinite" restart="never" nodeType="tmRoot"/>
+      </p:par>
+    </p:tnLst>
+  </p:timing>
+</p:sld>
+</file>
+
+<file path=ppt/slides/slide9.xml><?xml version="1.0" encoding="utf-8"?>
+<p:sld xmlns:a="http://schemas.openxmlformats.org/drawingml/2006/main" xmlns:r="http://schemas.openxmlformats.org/officeDocument/2006/relationships" xmlns:p="http://schemas.openxmlformats.org/presentationml/2006/main">
+  <p:cSld>
+    <p:spTree>
+      <p:nvGrpSpPr>
+        <p:cNvPr id="1" name=""/>
+        <p:cNvGrpSpPr/>
+        <p:nvPr/>
+      </p:nvGrpSpPr>
+      <p:grpSpPr>
+        <a:xfrm>
+          <a:off x="0" y="0"/>
+          <a:ext cx="0" cy="0"/>
+          <a:chOff x="0" y="0"/>
+          <a:chExt cx="0" cy="0"/>
+        </a:xfrm>
+      </p:grpSpPr>
+      <p:sp>
+        <p:nvSpPr>
           <p:cNvPr id="2" name="Title 1">
             <a:extLst>
               <a:ext uri="{FF2B5EF4-FFF2-40B4-BE49-F238E27FC236}">
@@ -5784,9 +6214,19 @@
             </a:r>
             <a:r>
               <a:rPr lang="en-US" dirty="0"/>
-              <a:t> package</a:t>
-            </a:r>
-            <a:endParaRPr lang="en-GB" dirty="0"/>
+              <a:t> </a:t>
+            </a:r>
+            <a:r>
+              <a:rPr lang="en-US" dirty="0" smtClean="0"/>
+              <a:t>package</a:t>
+            </a:r>
+            <a:endParaRPr lang="en-US" dirty="0" smtClean="0"/>
+          </a:p>
+          <a:p>
+            <a:r>
+              <a:rPr lang="en-US" dirty="0" smtClean="0"/>
+              <a:t>Improve domain logic for Courses</a:t>
+            </a:r>
           </a:p>
         </p:txBody>
       </p:sp>
@@ -5800,6 +6240,13 @@
   <p:clrMapOvr>
     <a:masterClrMapping/>
   </p:clrMapOvr>
+  <p:timing>
+    <p:tnLst>
+      <p:par>
+        <p:cTn id="1" dur="indefinite" restart="never" nodeType="tmRoot"/>
+      </p:par>
+    </p:tnLst>
+  </p:timing>
 </p:sld>
 </file>
 

</xml_diff>

<commit_message>
Done with slide show
</commit_message>
<xml_diff>
--- a/LearningHubInReview.pptx
+++ b/LearningHubInReview.pptx
@@ -12,8 +12,7 @@
     <p:sldId id="261" r:id="rId6"/>
     <p:sldId id="262" r:id="rId7"/>
     <p:sldId id="263" r:id="rId8"/>
-    <p:sldId id="264" r:id="rId9"/>
-    <p:sldId id="258" r:id="rId10"/>
+    <p:sldId id="258" r:id="rId9"/>
   </p:sldIdLst>
   <p:sldSz cx="12192000" cy="6858000"/>
   <p:notesSz cx="6858000" cy="9144000"/>
@@ -312,7 +311,7 @@
             <a:fld id="{B61BEF0D-F0BB-DE4B-95CE-6DB70DBA9567}" type="datetimeFigureOut">
               <a:rPr lang="en-US" dirty="0"/>
               <a:pPr/>
-              <a:t>3/12/2019</a:t>
+              <a:t>2019-03-13</a:t>
             </a:fld>
             <a:endParaRPr lang="en-US" dirty="0"/>
           </a:p>
@@ -745,7 +744,7 @@
             <a:fld id="{B61BEF0D-F0BB-DE4B-95CE-6DB70DBA9567}" type="datetimeFigureOut">
               <a:rPr lang="en-US" dirty="0"/>
               <a:pPr/>
-              <a:t>3/12/2019</a:t>
+              <a:t>2019-03-13</a:t>
             </a:fld>
             <a:endParaRPr lang="en-US" dirty="0"/>
           </a:p>
@@ -992,7 +991,7 @@
             <a:fld id="{B61BEF0D-F0BB-DE4B-95CE-6DB70DBA9567}" type="datetimeFigureOut">
               <a:rPr lang="en-US" dirty="0"/>
               <a:pPr/>
-              <a:t>3/12/2019</a:t>
+              <a:t>2019-03-13</a:t>
             </a:fld>
             <a:endParaRPr lang="en-US" dirty="0"/>
           </a:p>
@@ -1297,7 +1296,7 @@
             <a:fld id="{B61BEF0D-F0BB-DE4B-95CE-6DB70DBA9567}" type="datetimeFigureOut">
               <a:rPr lang="en-US" dirty="0"/>
               <a:pPr/>
-              <a:t>3/12/2019</a:t>
+              <a:t>2019-03-13</a:t>
             </a:fld>
             <a:endParaRPr lang="en-US" dirty="0"/>
           </a:p>
@@ -1612,7 +1611,7 @@
             <a:fld id="{B61BEF0D-F0BB-DE4B-95CE-6DB70DBA9567}" type="datetimeFigureOut">
               <a:rPr lang="en-US" dirty="0"/>
               <a:pPr/>
-              <a:t>3/12/2019</a:t>
+              <a:t>2019-03-13</a:t>
             </a:fld>
             <a:endParaRPr lang="en-US" dirty="0"/>
           </a:p>
@@ -1911,7 +1910,7 @@
             <a:fld id="{B61BEF0D-F0BB-DE4B-95CE-6DB70DBA9567}" type="datetimeFigureOut">
               <a:rPr lang="en-US" dirty="0"/>
               <a:pPr/>
-              <a:t>3/12/2019</a:t>
+              <a:t>2019-03-13</a:t>
             </a:fld>
             <a:endParaRPr lang="en-US" dirty="0"/>
           </a:p>
@@ -2275,7 +2274,7 @@
             <a:fld id="{B61BEF0D-F0BB-DE4B-95CE-6DB70DBA9567}" type="datetimeFigureOut">
               <a:rPr lang="en-US" dirty="0"/>
               <a:pPr/>
-              <a:t>3/12/2019</a:t>
+              <a:t>2019-03-13</a:t>
             </a:fld>
             <a:endParaRPr lang="en-US" dirty="0"/>
           </a:p>
@@ -2446,7 +2445,7 @@
             <a:fld id="{B61BEF0D-F0BB-DE4B-95CE-6DB70DBA9567}" type="datetimeFigureOut">
               <a:rPr lang="en-US" dirty="0"/>
               <a:pPr/>
-              <a:t>3/12/2019</a:t>
+              <a:t>2019-03-13</a:t>
             </a:fld>
             <a:endParaRPr lang="en-US" dirty="0"/>
           </a:p>
@@ -2623,7 +2622,7 @@
             <a:fld id="{B61BEF0D-F0BB-DE4B-95CE-6DB70DBA9567}" type="datetimeFigureOut">
               <a:rPr lang="en-US" dirty="0"/>
               <a:pPr/>
-              <a:t>3/12/2019</a:t>
+              <a:t>2019-03-13</a:t>
             </a:fld>
             <a:endParaRPr lang="en-US" dirty="0"/>
           </a:p>
@@ -2790,7 +2789,7 @@
             <a:fld id="{B61BEF0D-F0BB-DE4B-95CE-6DB70DBA9567}" type="datetimeFigureOut">
               <a:rPr lang="en-US" dirty="0"/>
               <a:pPr/>
-              <a:t>3/12/2019</a:t>
+              <a:t>2019-03-13</a:t>
             </a:fld>
             <a:endParaRPr lang="en-US" dirty="0"/>
           </a:p>
@@ -3037,7 +3036,7 @@
             <a:fld id="{B61BEF0D-F0BB-DE4B-95CE-6DB70DBA9567}" type="datetimeFigureOut">
               <a:rPr lang="en-US" dirty="0"/>
               <a:pPr/>
-              <a:t>3/12/2019</a:t>
+              <a:t>2019-03-13</a:t>
             </a:fld>
             <a:endParaRPr lang="en-US" dirty="0"/>
           </a:p>
@@ -3270,7 +3269,7 @@
             <a:fld id="{B61BEF0D-F0BB-DE4B-95CE-6DB70DBA9567}" type="datetimeFigureOut">
               <a:rPr lang="en-US" dirty="0"/>
               <a:pPr/>
-              <a:t>3/12/2019</a:t>
+              <a:t>2019-03-13</a:t>
             </a:fld>
             <a:endParaRPr lang="en-US" dirty="0"/>
           </a:p>
@@ -3649,7 +3648,7 @@
             <a:fld id="{B61BEF0D-F0BB-DE4B-95CE-6DB70DBA9567}" type="datetimeFigureOut">
               <a:rPr lang="en-US" dirty="0"/>
               <a:pPr/>
-              <a:t>3/12/2019</a:t>
+              <a:t>2019-03-13</a:t>
             </a:fld>
             <a:endParaRPr lang="en-US" dirty="0"/>
           </a:p>
@@ -3764,7 +3763,7 @@
             <a:fld id="{B61BEF0D-F0BB-DE4B-95CE-6DB70DBA9567}" type="datetimeFigureOut">
               <a:rPr lang="en-US" dirty="0"/>
               <a:pPr/>
-              <a:t>3/12/2019</a:t>
+              <a:t>2019-03-13</a:t>
             </a:fld>
             <a:endParaRPr lang="en-US" dirty="0"/>
           </a:p>
@@ -3856,7 +3855,7 @@
             <a:fld id="{B61BEF0D-F0BB-DE4B-95CE-6DB70DBA9567}" type="datetimeFigureOut">
               <a:rPr lang="en-US" dirty="0"/>
               <a:pPr/>
-              <a:t>3/12/2019</a:t>
+              <a:t>2019-03-13</a:t>
             </a:fld>
             <a:endParaRPr lang="en-US" dirty="0"/>
           </a:p>
@@ -4108,7 +4107,7 @@
             <a:fld id="{B61BEF0D-F0BB-DE4B-95CE-6DB70DBA9567}" type="datetimeFigureOut">
               <a:rPr lang="en-US" dirty="0"/>
               <a:pPr/>
-              <a:t>3/12/2019</a:t>
+              <a:t>2019-03-13</a:t>
             </a:fld>
             <a:endParaRPr lang="en-US" dirty="0"/>
           </a:p>
@@ -4388,7 +4387,7 @@
             <a:fld id="{B61BEF0D-F0BB-DE4B-95CE-6DB70DBA9567}" type="datetimeFigureOut">
               <a:rPr lang="en-US" dirty="0"/>
               <a:pPr/>
-              <a:t>3/12/2019</a:t>
+              <a:t>2019-03-13</a:t>
             </a:fld>
             <a:endParaRPr lang="en-US" dirty="0"/>
           </a:p>
@@ -4791,7 +4790,7 @@
             <a:fld id="{B61BEF0D-F0BB-DE4B-95CE-6DB70DBA9567}" type="datetimeFigureOut">
               <a:rPr lang="en-US" dirty="0"/>
               <a:pPr/>
-              <a:t>3/12/2019</a:t>
+              <a:t>2019-03-13</a:t>
             </a:fld>
             <a:endParaRPr lang="en-US" dirty="0"/>
           </a:p>
@@ -5395,18 +5394,16 @@
             </a:r>
           </a:p>
           <a:p>
-            <a:endParaRPr lang="en-ZA" dirty="0"/>
-          </a:p>
-          <a:p>
+            <a:endParaRPr lang="en-ZA"/>
+          </a:p>
+          <a:p>
+            <a:r>
+              <a:rPr lang="en-ZA"/>
+              <a:t>Proposed </a:t>
+            </a:r>
             <a:r>
               <a:rPr lang="en-ZA" dirty="0"/>
-              <a:t>Challenges Faced</a:t>
-            </a:r>
-          </a:p>
-          <a:p>
-            <a:r>
-              <a:rPr lang="en-ZA" dirty="0"/>
-              <a:t>Proposed Improvements</a:t>
+              <a:t>Improvements</a:t>
             </a:r>
           </a:p>
         </p:txBody>
@@ -5421,13 +5418,6 @@
   <p:clrMapOvr>
     <a:masterClrMapping/>
   </p:clrMapOvr>
-  <p:timing>
-    <p:tnLst>
-      <p:par>
-        <p:cTn id="1" dur="indefinite" restart="never" nodeType="tmRoot"/>
-      </p:par>
-    </p:tnLst>
-  </p:timing>
 </p:sld>
 </file>
 
@@ -5710,13 +5700,6 @@
   <p:clrMapOvr>
     <a:masterClrMapping/>
   </p:clrMapOvr>
-  <p:timing>
-    <p:tnLst>
-      <p:par>
-        <p:cTn id="1" dur="indefinite" restart="never" nodeType="tmRoot"/>
-      </p:par>
-    </p:tnLst>
-  </p:timing>
 </p:sld>
 </file>
 
@@ -5753,39 +5736,51 @@
           <a:lstStyle/>
           <a:p>
             <a:r>
-              <a:rPr lang="en-ZA" dirty="0" smtClean="0"/>
+              <a:rPr lang="en-ZA" dirty="0"/>
               <a:t>Decisions</a:t>
             </a:r>
+          </a:p>
+        </p:txBody>
+      </p:sp>
+      <p:sp>
+        <p:nvSpPr>
+          <p:cNvPr id="3" name="Content Placeholder 2"/>
+          <p:cNvSpPr>
+            <a:spLocks noGrp="1"/>
+          </p:cNvSpPr>
+          <p:nvPr>
+            <p:ph idx="1"/>
+          </p:nvPr>
+        </p:nvSpPr>
+        <p:spPr/>
+        <p:txBody>
+          <a:bodyPr/>
+          <a:lstStyle/>
+          <a:p>
+            <a:r>
+              <a:rPr lang="en-ZA" dirty="0"/>
+              <a:t>.NET Core supports high performance and scalable systems.</a:t>
+            </a:r>
+          </a:p>
+          <a:p>
+            <a:r>
+              <a:rPr lang="en-ZA" dirty="0"/>
+              <a:t>Azure Message Bus was used over RabbitMQ etc. (Easy Access)</a:t>
+            </a:r>
+          </a:p>
+          <a:p>
+            <a:r>
+              <a:rPr lang="en-ZA" dirty="0"/>
+              <a:t>Microsoft’s </a:t>
+            </a:r>
+            <a:r>
+              <a:rPr lang="en-GB" dirty="0"/>
+              <a:t>Memory Caching is easy to implement and provides the required functionality.</a:t>
+            </a:r>
             <a:endParaRPr lang="en-ZA" dirty="0"/>
           </a:p>
-        </p:txBody>
-      </p:sp>
-      <p:sp>
-        <p:nvSpPr>
-          <p:cNvPr id="3" name="Content Placeholder 2"/>
-          <p:cNvSpPr>
-            <a:spLocks noGrp="1"/>
-          </p:cNvSpPr>
-          <p:nvPr>
-            <p:ph idx="1"/>
-          </p:nvPr>
-        </p:nvSpPr>
-        <p:spPr/>
-        <p:txBody>
-          <a:bodyPr/>
-          <a:lstStyle/>
-          <a:p>
-            <a:r>
-              <a:rPr lang="en-ZA" dirty="0" smtClean="0"/>
-              <a:t>.NET </a:t>
-            </a:r>
-            <a:r>
-              <a:rPr lang="en-ZA" dirty="0" smtClean="0"/>
-              <a:t>Core supports high performance and scalable systems.</a:t>
-            </a:r>
-          </a:p>
-          <a:p>
-            <a:endParaRPr lang="en-ZA" dirty="0" smtClean="0"/>
+          <a:p>
+            <a:endParaRPr lang="en-ZA" dirty="0"/>
           </a:p>
           <a:p>
             <a:endParaRPr lang="en-ZA" dirty="0"/>
@@ -5802,13 +5797,6 @@
   <p:clrMapOvr>
     <a:masterClrMapping/>
   </p:clrMapOvr>
-  <p:timing>
-    <p:tnLst>
-      <p:par>
-        <p:cTn id="1" dur="indefinite" restart="never" nodeType="tmRoot"/>
-      </p:par>
-    </p:tnLst>
-  </p:timing>
 </p:sld>
 </file>
 
@@ -5845,10 +5833,9 @@
           <a:lstStyle/>
           <a:p>
             <a:r>
-              <a:rPr lang="en-ZA" dirty="0" smtClean="0"/>
+              <a:rPr lang="en-ZA" dirty="0"/>
               <a:t>Solving Part 1</a:t>
             </a:r>
-            <a:endParaRPr lang="en-ZA" dirty="0"/>
           </a:p>
         </p:txBody>
       </p:sp>
@@ -5867,7 +5854,22 @@
           <a:bodyPr/>
           <a:lstStyle/>
           <a:p>
-            <a:endParaRPr lang="en-ZA"/>
+            <a:r>
+              <a:rPr lang="en-ZA" dirty="0"/>
+              <a:t>Create the solution with the required project structure</a:t>
+            </a:r>
+          </a:p>
+          <a:p>
+            <a:r>
+              <a:rPr lang="en-ZA" dirty="0"/>
+              <a:t>Add API, entities and EF database</a:t>
+            </a:r>
+          </a:p>
+          <a:p>
+            <a:r>
+              <a:rPr lang="en-ZA" dirty="0"/>
+              <a:t>Set up seed data and add main logic</a:t>
+            </a:r>
           </a:p>
         </p:txBody>
       </p:sp>
@@ -5881,13 +5883,6 @@
   <p:clrMapOvr>
     <a:masterClrMapping/>
   </p:clrMapOvr>
-  <p:timing>
-    <p:tnLst>
-      <p:par>
-        <p:cTn id="1" dur="indefinite" restart="never" nodeType="tmRoot"/>
-      </p:par>
-    </p:tnLst>
-  </p:timing>
 </p:sld>
 </file>
 
@@ -5924,10 +5919,9 @@
           <a:lstStyle/>
           <a:p>
             <a:r>
-              <a:rPr lang="en-ZA" dirty="0" smtClean="0"/>
+              <a:rPr lang="en-ZA" dirty="0"/>
               <a:t>Solving Part 2</a:t>
             </a:r>
-            <a:endParaRPr lang="en-ZA" dirty="0"/>
           </a:p>
         </p:txBody>
       </p:sp>
@@ -5946,7 +5940,22 @@
           <a:bodyPr/>
           <a:lstStyle/>
           <a:p>
-            <a:endParaRPr lang="en-ZA"/>
+            <a:r>
+              <a:rPr lang="en-ZA" dirty="0"/>
+              <a:t>Add new async method</a:t>
+            </a:r>
+          </a:p>
+          <a:p>
+            <a:r>
+              <a:rPr lang="en-ZA" dirty="0"/>
+              <a:t>Add Azure dependency and implement queue client</a:t>
+            </a:r>
+          </a:p>
+          <a:p>
+            <a:r>
+              <a:rPr lang="en-ZA" dirty="0"/>
+              <a:t>Create agent application</a:t>
+            </a:r>
           </a:p>
         </p:txBody>
       </p:sp>
@@ -5960,13 +5969,6 @@
   <p:clrMapOvr>
     <a:masterClrMapping/>
   </p:clrMapOvr>
-  <p:timing>
-    <p:tnLst>
-      <p:par>
-        <p:cTn id="1" dur="indefinite" restart="never" nodeType="tmRoot"/>
-      </p:par>
-    </p:tnLst>
-  </p:timing>
 </p:sld>
 </file>
 
@@ -6003,29 +6005,52 @@
           <a:lstStyle/>
           <a:p>
             <a:r>
-              <a:rPr lang="en-ZA" dirty="0" smtClean="0"/>
+              <a:rPr lang="en-ZA" dirty="0"/>
               <a:t>Solving Part 3</a:t>
             </a:r>
+          </a:p>
+        </p:txBody>
+      </p:sp>
+      <p:sp>
+        <p:nvSpPr>
+          <p:cNvPr id="3" name="Content Placeholder 2"/>
+          <p:cNvSpPr>
+            <a:spLocks noGrp="1"/>
+          </p:cNvSpPr>
+          <p:nvPr>
+            <p:ph idx="1"/>
+          </p:nvPr>
+        </p:nvSpPr>
+        <p:spPr/>
+        <p:txBody>
+          <a:bodyPr/>
+          <a:lstStyle/>
+          <a:p>
+            <a:r>
+              <a:rPr lang="en-ZA" dirty="0"/>
+              <a:t>Create new controller</a:t>
+            </a:r>
+          </a:p>
+          <a:p>
+            <a:r>
+              <a:rPr lang="en-ZA" dirty="0"/>
+              <a:t>Add new service methods</a:t>
+            </a:r>
+          </a:p>
+          <a:p>
+            <a:r>
+              <a:rPr lang="en-ZA" dirty="0"/>
+              <a:t>Add logic to calculate the required information</a:t>
+            </a:r>
+          </a:p>
+          <a:p>
+            <a:r>
+              <a:rPr lang="en-ZA" dirty="0"/>
+              <a:t>Add cache to store responses for a limited time</a:t>
+            </a:r>
+          </a:p>
+          <a:p>
             <a:endParaRPr lang="en-ZA" dirty="0"/>
-          </a:p>
-        </p:txBody>
-      </p:sp>
-      <p:sp>
-        <p:nvSpPr>
-          <p:cNvPr id="3" name="Content Placeholder 2"/>
-          <p:cNvSpPr>
-            <a:spLocks noGrp="1"/>
-          </p:cNvSpPr>
-          <p:nvPr>
-            <p:ph idx="1"/>
-          </p:nvPr>
-        </p:nvSpPr>
-        <p:spPr/>
-        <p:txBody>
-          <a:bodyPr/>
-          <a:lstStyle/>
-          <a:p>
-            <a:endParaRPr lang="en-ZA"/>
           </a:p>
         </p:txBody>
       </p:sp>
@@ -6039,13 +6064,6 @@
   <p:clrMapOvr>
     <a:masterClrMapping/>
   </p:clrMapOvr>
-  <p:timing>
-    <p:tnLst>
-      <p:par>
-        <p:cTn id="1" dur="indefinite" restart="never" nodeType="tmRoot"/>
-      </p:par>
-    </p:tnLst>
-  </p:timing>
 </p:sld>
 </file>
 
@@ -6068,88 +6086,6 @@
       </p:grpSpPr>
       <p:sp>
         <p:nvSpPr>
-          <p:cNvPr id="2" name="Title 1"/>
-          <p:cNvSpPr>
-            <a:spLocks noGrp="1"/>
-          </p:cNvSpPr>
-          <p:nvPr>
-            <p:ph type="title"/>
-          </p:nvPr>
-        </p:nvSpPr>
-        <p:spPr/>
-        <p:txBody>
-          <a:bodyPr/>
-          <a:lstStyle/>
-          <a:p>
-            <a:r>
-              <a:rPr lang="en-ZA" dirty="0" smtClean="0"/>
-              <a:t>Problems </a:t>
-            </a:r>
-            <a:r>
-              <a:rPr lang="en-ZA" dirty="0"/>
-              <a:t>and Challenges</a:t>
-            </a:r>
-          </a:p>
-        </p:txBody>
-      </p:sp>
-      <p:sp>
-        <p:nvSpPr>
-          <p:cNvPr id="3" name="Content Placeholder 2"/>
-          <p:cNvSpPr>
-            <a:spLocks noGrp="1"/>
-          </p:cNvSpPr>
-          <p:nvPr>
-            <p:ph idx="1"/>
-          </p:nvPr>
-        </p:nvSpPr>
-        <p:spPr/>
-        <p:txBody>
-          <a:bodyPr/>
-          <a:lstStyle/>
-          <a:p>
-            <a:endParaRPr lang="en-ZA"/>
-          </a:p>
-        </p:txBody>
-      </p:sp>
-    </p:spTree>
-    <p:extLst>
-      <p:ext uri="{BB962C8B-B14F-4D97-AF65-F5344CB8AC3E}">
-        <p14:creationId xmlns:p14="http://schemas.microsoft.com/office/powerpoint/2010/main" val="3182702612"/>
-      </p:ext>
-    </p:extLst>
-  </p:cSld>
-  <p:clrMapOvr>
-    <a:masterClrMapping/>
-  </p:clrMapOvr>
-  <p:timing>
-    <p:tnLst>
-      <p:par>
-        <p:cTn id="1" dur="indefinite" restart="never" nodeType="tmRoot"/>
-      </p:par>
-    </p:tnLst>
-  </p:timing>
-</p:sld>
-</file>
-
-<file path=ppt/slides/slide9.xml><?xml version="1.0" encoding="utf-8"?>
-<p:sld xmlns:a="http://schemas.openxmlformats.org/drawingml/2006/main" xmlns:r="http://schemas.openxmlformats.org/officeDocument/2006/relationships" xmlns:p="http://schemas.openxmlformats.org/presentationml/2006/main">
-  <p:cSld>
-    <p:spTree>
-      <p:nvGrpSpPr>
-        <p:cNvPr id="1" name=""/>
-        <p:cNvGrpSpPr/>
-        <p:nvPr/>
-      </p:nvGrpSpPr>
-      <p:grpSpPr>
-        <a:xfrm>
-          <a:off x="0" y="0"/>
-          <a:ext cx="0" cy="0"/>
-          <a:chOff x="0" y="0"/>
-          <a:chExt cx="0" cy="0"/>
-        </a:xfrm>
-      </p:grpSpPr>
-      <p:sp>
-        <p:nvSpPr>
           <p:cNvPr id="2" name="Title 1">
             <a:extLst>
               <a:ext uri="{FF2B5EF4-FFF2-40B4-BE49-F238E27FC236}">
@@ -6200,13 +6136,15 @@
           <a:p>
             <a:r>
               <a:rPr lang="en-US" dirty="0"/>
-              <a:t>Change Architecture</a:t>
-            </a:r>
-          </a:p>
-          <a:p>
+              <a:t>Don’t use </a:t>
+            </a:r>
+            <a:r>
+              <a:rPr lang="en-US" dirty="0" err="1"/>
+              <a:t>DotNetCore</a:t>
+            </a:r>
             <a:r>
               <a:rPr lang="en-US" dirty="0"/>
-              <a:t>Don’t use </a:t>
+              <a:t> </a:t>
             </a:r>
             <a:r>
               <a:rPr lang="en-US" dirty="0" err="1"/>
@@ -6214,18 +6152,30 @@
             </a:r>
             <a:r>
               <a:rPr lang="en-US" dirty="0"/>
-              <a:t> </a:t>
-            </a:r>
-            <a:r>
-              <a:rPr lang="en-US" dirty="0" smtClean="0"/>
-              <a:t>package</a:t>
-            </a:r>
-            <a:endParaRPr lang="en-US" dirty="0" smtClean="0"/>
-          </a:p>
-          <a:p>
-            <a:r>
-              <a:rPr lang="en-US" dirty="0" smtClean="0"/>
+              <a:t> package that hides some of the complexities of .</a:t>
+            </a:r>
+            <a:r>
+              <a:rPr lang="en-US" dirty="0" err="1"/>
+              <a:t>NetCore</a:t>
+            </a:r>
+            <a:endParaRPr lang="en-US" dirty="0"/>
+          </a:p>
+          <a:p>
+            <a:r>
+              <a:rPr lang="en-US" dirty="0"/>
               <a:t>Improve domain logic for Courses</a:t>
+            </a:r>
+          </a:p>
+          <a:p>
+            <a:r>
+              <a:rPr lang="en-US" dirty="0"/>
+              <a:t>Improve the use of dependency injection</a:t>
+            </a:r>
+          </a:p>
+          <a:p>
+            <a:r>
+              <a:rPr lang="en-US" dirty="0"/>
+              <a:t>Add unit tests with NUnit</a:t>
             </a:r>
           </a:p>
         </p:txBody>
@@ -6240,13 +6190,6 @@
   <p:clrMapOvr>
     <a:masterClrMapping/>
   </p:clrMapOvr>
-  <p:timing>
-    <p:tnLst>
-      <p:par>
-        <p:cTn id="1" dur="indefinite" restart="never" nodeType="tmRoot"/>
-      </p:par>
-    </p:tnLst>
-  </p:timing>
 </p:sld>
 </file>
 

</xml_diff>